<commit_message>
change the source of ui
</commit_message>
<xml_diff>
--- a/Presentation/presentation.pptx
+++ b/Presentation/presentation.pptx
@@ -508,6 +508,94 @@
 </file>
 
 <file path=ppt/notesSlides/notesSlide1.xml><?xml version="1.0" encoding="utf-8"?>
+<p:notes xmlns:a="http://schemas.openxmlformats.org/drawingml/2006/main" xmlns:r="http://schemas.openxmlformats.org/officeDocument/2006/relationships" xmlns:p="http://schemas.openxmlformats.org/presentationml/2006/main">
+  <p:cSld>
+    <p:spTree>
+      <p:nvGrpSpPr>
+        <p:cNvPr id="1" name=""/>
+        <p:cNvGrpSpPr/>
+        <p:nvPr/>
+      </p:nvGrpSpPr>
+      <p:grpSpPr>
+        <a:xfrm>
+          <a:off x="0" y="0"/>
+          <a:ext cx="0" cy="0"/>
+          <a:chOff x="0" y="0"/>
+          <a:chExt cx="0" cy="0"/>
+        </a:xfrm>
+      </p:grpSpPr>
+      <p:sp>
+        <p:nvSpPr>
+          <p:cNvPr id="2" name="幻灯片图像占位符 1"/>
+          <p:cNvSpPr>
+            <a:spLocks noGrp="1" noRot="1" noChangeAspect="1"/>
+          </p:cNvSpPr>
+          <p:nvPr>
+            <p:ph type="sldImg"/>
+          </p:nvPr>
+        </p:nvSpPr>
+        <p:spPr/>
+      </p:sp>
+      <p:sp>
+        <p:nvSpPr>
+          <p:cNvPr id="3" name="备注占位符 2"/>
+          <p:cNvSpPr>
+            <a:spLocks noGrp="1"/>
+          </p:cNvSpPr>
+          <p:nvPr>
+            <p:ph type="body" idx="1"/>
+          </p:nvPr>
+        </p:nvSpPr>
+        <p:spPr/>
+        <p:txBody>
+          <a:bodyPr/>
+          <a:lstStyle/>
+          <a:p>
+            <a:r>
+              <a:rPr lang="zh-CN" altLang="en-US" dirty="0" smtClean="0"/>
+              <a:t>左边一列为用户，右边一列是管理员</a:t>
+            </a:r>
+            <a:endParaRPr lang="zh-CN" altLang="en-US" dirty="0"/>
+          </a:p>
+        </p:txBody>
+      </p:sp>
+      <p:sp>
+        <p:nvSpPr>
+          <p:cNvPr id="4" name="灯片编号占位符 3"/>
+          <p:cNvSpPr>
+            <a:spLocks noGrp="1"/>
+          </p:cNvSpPr>
+          <p:nvPr>
+            <p:ph type="sldNum" sz="quarter" idx="10"/>
+          </p:nvPr>
+        </p:nvSpPr>
+        <p:spPr/>
+        <p:txBody>
+          <a:bodyPr/>
+          <a:lstStyle/>
+          <a:p>
+            <a:fld id="{211336F0-A849-4C36-B24A-3009716B13CE}" type="slidenum">
+              <a:rPr lang="zh-CN" altLang="en-US" smtClean="0"/>
+              <a:t>4</a:t>
+            </a:fld>
+            <a:endParaRPr lang="zh-CN" altLang="en-US"/>
+          </a:p>
+        </p:txBody>
+      </p:sp>
+    </p:spTree>
+    <p:extLst>
+      <p:ext uri="{BB962C8B-B14F-4D97-AF65-F5344CB8AC3E}">
+        <p14:creationId xmlns:p14="http://schemas.microsoft.com/office/powerpoint/2010/main" val="1307311327"/>
+      </p:ext>
+    </p:extLst>
+  </p:cSld>
+  <p:clrMapOvr>
+    <a:masterClrMapping/>
+  </p:clrMapOvr>
+</p:notes>
+</file>
+
+<file path=ppt/notesSlides/notesSlide2.xml><?xml version="1.0" encoding="utf-8"?>
 <p:notes xmlns:a="http://schemas.openxmlformats.org/drawingml/2006/main" xmlns:r="http://schemas.openxmlformats.org/officeDocument/2006/relationships" xmlns:p="http://schemas.openxmlformats.org/presentationml/2006/main">
   <p:cSld>
     <p:spTree>
@@ -10418,52 +10506,6 @@
       </p:sp>
       <p:sp>
         <p:nvSpPr>
-          <p:cNvPr id="44" name="流程图: 摘录 43"/>
-          <p:cNvSpPr/>
-          <p:nvPr/>
-        </p:nvSpPr>
-        <p:spPr>
-          <a:xfrm rot="5400000" flipH="1" flipV="1">
-            <a:off x="7053987" y="2598450"/>
-            <a:ext cx="440234" cy="360690"/>
-          </a:xfrm>
-          <a:prstGeom prst="flowChartExtract">
-            <a:avLst/>
-          </a:prstGeom>
-          <a:noFill/>
-          <a:ln w="12700">
-            <a:solidFill>
-              <a:schemeClr val="bg1"/>
-            </a:solidFill>
-          </a:ln>
-        </p:spPr>
-        <p:style>
-          <a:lnRef idx="2">
-            <a:schemeClr val="accent1">
-              <a:shade val="50000"/>
-            </a:schemeClr>
-          </a:lnRef>
-          <a:fillRef idx="1">
-            <a:schemeClr val="accent1"/>
-          </a:fillRef>
-          <a:effectRef idx="0">
-            <a:schemeClr val="accent1"/>
-          </a:effectRef>
-          <a:fontRef idx="minor">
-            <a:schemeClr val="lt1"/>
-          </a:fontRef>
-        </p:style>
-        <p:txBody>
-          <a:bodyPr rtlCol="0" anchor="ctr"/>
-          <a:lstStyle/>
-          <a:p>
-            <a:pPr algn="ctr"/>
-            <a:endParaRPr lang="zh-CN" altLang="en-US"/>
-          </a:p>
-        </p:txBody>
-      </p:sp>
-      <p:sp>
-        <p:nvSpPr>
           <p:cNvPr id="49" name="流程图: 联系 48"/>
           <p:cNvSpPr/>
           <p:nvPr/>
@@ -11543,8 +11585,8 @@
         </p:nvSpPr>
         <p:spPr>
           <a:xfrm>
-            <a:off x="3930187" y="2422660"/>
-            <a:ext cx="1250122" cy="769441"/>
+            <a:off x="3930187" y="2576548"/>
+            <a:ext cx="1250122" cy="461665"/>
           </a:xfrm>
           <a:prstGeom prst="rect">
             <a:avLst/>
@@ -11576,47 +11618,7 @@
                 <a:latin typeface="微软雅黑" panose="020B0503020204020204" pitchFamily="34" charset="-122"/>
                 <a:ea typeface="微软雅黑" panose="020B0503020204020204" pitchFamily="34" charset="-122"/>
               </a:rPr>
-              <a:t>标题</a:t>
-            </a:r>
-            <a:endParaRPr lang="en-US" altLang="zh-CN" sz="2400" b="1" dirty="0" smtClean="0">
-              <a:solidFill>
-                <a:schemeClr val="tx1">
-                  <a:lumMod val="75000"/>
-                  <a:lumOff val="25000"/>
-                </a:schemeClr>
-              </a:solidFill>
-              <a:effectLst>
-                <a:outerShdw blurRad="38100" dist="38100" dir="2700000" algn="tl">
-                  <a:srgbClr val="000000">
-                    <a:alpha val="43137"/>
-                  </a:srgbClr>
-                </a:outerShdw>
-              </a:effectLst>
-              <a:latin typeface="微软雅黑" panose="020B0503020204020204" pitchFamily="34" charset="-122"/>
-              <a:ea typeface="微软雅黑" panose="020B0503020204020204" pitchFamily="34" charset="-122"/>
-            </a:endParaRPr>
-          </a:p>
-          <a:p>
-            <a:pPr algn="ctr"/>
-            <a:r>
-              <a:rPr lang="en-US" altLang="zh-CN" sz="2000" b="1" dirty="0" smtClean="0">
-                <a:solidFill>
-                  <a:schemeClr val="tx1">
-                    <a:lumMod val="75000"/>
-                    <a:lumOff val="25000"/>
-                  </a:schemeClr>
-                </a:solidFill>
-                <a:effectLst>
-                  <a:outerShdw blurRad="38100" dist="38100" dir="2700000" algn="tl">
-                    <a:srgbClr val="000000">
-                      <a:alpha val="43137"/>
-                    </a:srgbClr>
-                  </a:outerShdw>
-                </a:effectLst>
-                <a:latin typeface="微软雅黑" panose="020B0503020204020204" pitchFamily="34" charset="-122"/>
-                <a:ea typeface="微软雅黑" panose="020B0503020204020204" pitchFamily="34" charset="-122"/>
-              </a:rPr>
-              <a:t>1</a:t>
+              <a:t>功能</a:t>
             </a:r>
             <a:endParaRPr lang="zh-CN" altLang="en-US" sz="2000" b="1" dirty="0">
               <a:solidFill>
@@ -12061,7 +12063,7 @@
           <a:p>
             <a:pPr algn="r"/>
             <a:r>
-              <a:rPr lang="zh-CN" altLang="en-US" sz="1600" b="1" dirty="0">
+              <a:rPr lang="zh-CN" altLang="en-US" sz="1600" b="1" dirty="0" smtClean="0">
                 <a:solidFill>
                   <a:schemeClr val="tx1">
                     <a:lumMod val="75000"/>
@@ -12071,7 +12073,7 @@
                 <a:latin typeface="微软雅黑" panose="020B0503020204020204" pitchFamily="34" charset="-122"/>
                 <a:ea typeface="微软雅黑" panose="020B0503020204020204" pitchFamily="34" charset="-122"/>
               </a:rPr>
-              <a:t>内容</a:t>
+              <a:t>用户注册登录</a:t>
             </a:r>
             <a:endParaRPr lang="en-US" altLang="zh-CN" sz="1600" b="1" dirty="0">
               <a:solidFill>
@@ -12110,7 +12112,7 @@
           <a:p>
             <a:pPr algn="r"/>
             <a:r>
-              <a:rPr lang="zh-CN" altLang="en-US" sz="1600" b="1" dirty="0">
+              <a:rPr lang="zh-CN" altLang="en-US" sz="1600" b="1" dirty="0" smtClean="0">
                 <a:solidFill>
                   <a:schemeClr val="tx1">
                     <a:lumMod val="75000"/>
@@ -12120,7 +12122,20 @@
                 <a:latin typeface="微软雅黑" panose="020B0503020204020204" pitchFamily="34" charset="-122"/>
                 <a:ea typeface="微软雅黑" panose="020B0503020204020204" pitchFamily="34" charset="-122"/>
               </a:rPr>
-              <a:t>内容</a:t>
+              <a:t>查购退</a:t>
+            </a:r>
+            <a:r>
+              <a:rPr lang="zh-CN" altLang="en-US" sz="1600" b="1" dirty="0" smtClean="0">
+                <a:solidFill>
+                  <a:schemeClr val="tx1">
+                    <a:lumMod val="75000"/>
+                    <a:lumOff val="25000"/>
+                  </a:schemeClr>
+                </a:solidFill>
+                <a:latin typeface="微软雅黑" panose="020B0503020204020204" pitchFamily="34" charset="-122"/>
+                <a:ea typeface="微软雅黑" panose="020B0503020204020204" pitchFamily="34" charset="-122"/>
+              </a:rPr>
+              <a:t>车票</a:t>
             </a:r>
             <a:endParaRPr lang="en-US" altLang="zh-CN" sz="1600" b="1" dirty="0">
               <a:solidFill>
@@ -12168,7 +12183,7 @@
                 <a:latin typeface="微软雅黑" panose="020B0503020204020204" pitchFamily="34" charset="-122"/>
                 <a:ea typeface="微软雅黑" panose="020B0503020204020204" pitchFamily="34" charset="-122"/>
               </a:rPr>
-              <a:t>内容</a:t>
+              <a:t>管理员登录</a:t>
             </a:r>
             <a:endParaRPr lang="en-US" altLang="zh-CN" sz="1600" b="1" dirty="0">
               <a:solidFill>
@@ -12216,7 +12231,20 @@
                 <a:latin typeface="微软雅黑" panose="020B0503020204020204" pitchFamily="34" charset="-122"/>
                 <a:ea typeface="微软雅黑" panose="020B0503020204020204" pitchFamily="34" charset="-122"/>
               </a:rPr>
-              <a:t>内容</a:t>
+              <a:t>查询</a:t>
+            </a:r>
+            <a:r>
+              <a:rPr lang="zh-CN" altLang="en-US" sz="1600" b="1" dirty="0" smtClean="0">
+                <a:solidFill>
+                  <a:schemeClr val="tx1">
+                    <a:lumMod val="75000"/>
+                    <a:lumOff val="25000"/>
+                  </a:schemeClr>
+                </a:solidFill>
+                <a:latin typeface="微软雅黑" panose="020B0503020204020204" pitchFamily="34" charset="-122"/>
+                <a:ea typeface="微软雅黑" panose="020B0503020204020204" pitchFamily="34" charset="-122"/>
+              </a:rPr>
+              <a:t>修改用户</a:t>
             </a:r>
             <a:endParaRPr lang="en-US" altLang="zh-CN" sz="1600" b="1" dirty="0">
               <a:solidFill>
@@ -12254,7 +12282,7 @@
           <a:lstStyle/>
           <a:p>
             <a:r>
-              <a:rPr lang="zh-CN" altLang="en-US" sz="1600" b="1" dirty="0">
+              <a:rPr lang="zh-CN" altLang="en-US" sz="1600" b="1" dirty="0" smtClean="0">
                 <a:solidFill>
                   <a:schemeClr val="tx1">
                     <a:lumMod val="75000"/>
@@ -12264,7 +12292,7 @@
                 <a:latin typeface="微软雅黑" panose="020B0503020204020204" pitchFamily="34" charset="-122"/>
                 <a:ea typeface="微软雅黑" panose="020B0503020204020204" pitchFamily="34" charset="-122"/>
               </a:rPr>
-              <a:t>内容</a:t>
+              <a:t>增删改运行计划</a:t>
             </a:r>
             <a:endParaRPr lang="en-US" altLang="zh-CN" sz="1600" b="1" dirty="0">
               <a:solidFill>
@@ -12303,7 +12331,7 @@
           <a:p>
             <a:pPr algn="r"/>
             <a:r>
-              <a:rPr lang="zh-CN" altLang="en-US" sz="1600" b="1" dirty="0">
+              <a:rPr lang="zh-CN" altLang="en-US" sz="1600" b="1" dirty="0" smtClean="0">
                 <a:solidFill>
                   <a:schemeClr val="tx1">
                     <a:lumMod val="75000"/>
@@ -12313,7 +12341,7 @@
                 <a:latin typeface="微软雅黑" panose="020B0503020204020204" pitchFamily="34" charset="-122"/>
                 <a:ea typeface="微软雅黑" panose="020B0503020204020204" pitchFamily="34" charset="-122"/>
               </a:rPr>
-              <a:t>内容</a:t>
+              <a:t>信息修改</a:t>
             </a:r>
             <a:endParaRPr lang="en-US" altLang="zh-CN" sz="1600" b="1" dirty="0">
               <a:solidFill>
@@ -12336,8 +12364,8 @@
         </p:nvSpPr>
         <p:spPr>
           <a:xfrm>
-            <a:off x="3940819" y="905173"/>
-            <a:ext cx="1250122" cy="338554"/>
+            <a:off x="3940819" y="782063"/>
+            <a:ext cx="1250122" cy="584775"/>
           </a:xfrm>
           <a:prstGeom prst="rect">
             <a:avLst/>
@@ -12362,7 +12390,33 @@
                 <a:latin typeface="微软雅黑" panose="020B0503020204020204" pitchFamily="34" charset="-122"/>
                 <a:ea typeface="微软雅黑" panose="020B0503020204020204" pitchFamily="34" charset="-122"/>
               </a:rPr>
-              <a:t>内容</a:t>
+              <a:t>车票查询（</a:t>
+            </a:r>
+            <a:r>
+              <a:rPr lang="en-US" altLang="zh-CN" sz="1600" b="1" dirty="0" smtClean="0">
+                <a:solidFill>
+                  <a:schemeClr val="tx1">
+                    <a:lumMod val="75000"/>
+                    <a:lumOff val="25000"/>
+                  </a:schemeClr>
+                </a:solidFill>
+                <a:latin typeface="微软雅黑" panose="020B0503020204020204" pitchFamily="34" charset="-122"/>
+                <a:ea typeface="微软雅黑" panose="020B0503020204020204" pitchFamily="34" charset="-122"/>
+              </a:rPr>
+              <a:t>3</a:t>
+            </a:r>
+            <a:r>
+              <a:rPr lang="zh-CN" altLang="en-US" sz="1600" b="1" dirty="0" smtClean="0">
+                <a:solidFill>
+                  <a:schemeClr val="tx1">
+                    <a:lumMod val="75000"/>
+                    <a:lumOff val="25000"/>
+                  </a:schemeClr>
+                </a:solidFill>
+                <a:latin typeface="微软雅黑" panose="020B0503020204020204" pitchFamily="34" charset="-122"/>
+                <a:ea typeface="微软雅黑" panose="020B0503020204020204" pitchFamily="34" charset="-122"/>
+              </a:rPr>
+              <a:t>种方式）</a:t>
             </a:r>
             <a:endParaRPr lang="en-US" altLang="zh-CN" sz="1600" b="1" dirty="0" smtClean="0">
               <a:solidFill>

</xml_diff>

<commit_message>
Delete the registBtn in login ui, and change a lot in ppt
</commit_message>
<xml_diff>
--- a/Presentation/presentation.pptx
+++ b/Presentation/presentation.pptx
@@ -5,7 +5,7 @@
     <p:sldMasterId id="2147483648" r:id="rId1"/>
   </p:sldMasterIdLst>
   <p:notesMasterIdLst>
-    <p:notesMasterId r:id="rId19"/>
+    <p:notesMasterId r:id="rId20"/>
   </p:notesMasterIdLst>
   <p:sldIdLst>
     <p:sldId id="256" r:id="rId2"/>
@@ -19,12 +19,13 @@
     <p:sldId id="277" r:id="rId10"/>
     <p:sldId id="262" r:id="rId11"/>
     <p:sldId id="269" r:id="rId12"/>
-    <p:sldId id="268" r:id="rId13"/>
-    <p:sldId id="263" r:id="rId14"/>
-    <p:sldId id="266" r:id="rId15"/>
-    <p:sldId id="271" r:id="rId16"/>
-    <p:sldId id="273" r:id="rId17"/>
-    <p:sldId id="272" r:id="rId18"/>
+    <p:sldId id="279" r:id="rId13"/>
+    <p:sldId id="268" r:id="rId14"/>
+    <p:sldId id="263" r:id="rId15"/>
+    <p:sldId id="266" r:id="rId16"/>
+    <p:sldId id="271" r:id="rId17"/>
+    <p:sldId id="273" r:id="rId18"/>
+    <p:sldId id="272" r:id="rId19"/>
   </p:sldIdLst>
   <p:sldSz cx="9144000" cy="5143500" type="screen16x9"/>
   <p:notesSz cx="6858000" cy="9144000"/>
@@ -670,7 +671,7 @@
                 </a:solidFill>
               </a:rPr>
               <a:pPr/>
-              <a:t>17</a:t>
+              <a:t>18</a:t>
             </a:fld>
             <a:endParaRPr lang="zh-CN" altLang="en-US">
               <a:solidFill>
@@ -5225,127 +5226,19 @@
       </p:sp>
       <p:sp>
         <p:nvSpPr>
-          <p:cNvPr id="7" name="矩形 6"/>
-          <p:cNvSpPr/>
+          <p:cNvPr id="13" name="TextBox 12"/>
+          <p:cNvSpPr txBox="1"/>
           <p:nvPr/>
         </p:nvSpPr>
         <p:spPr>
           <a:xfrm>
-            <a:off x="516736" y="1021263"/>
-            <a:ext cx="2715110" cy="315898"/>
+            <a:off x="5315521" y="2375138"/>
+            <a:ext cx="3672408" cy="1754326"/>
           </a:xfrm>
           <a:prstGeom prst="rect">
             <a:avLst/>
           </a:prstGeom>
-          <a:solidFill>
-            <a:srgbClr val="FFC000"/>
-          </a:solidFill>
-          <a:ln>
-            <a:noFill/>
-          </a:ln>
-          <a:effectLst>
-            <a:outerShdw blurRad="50800" dist="38100" dir="5400000" algn="t" rotWithShape="0">
-              <a:prstClr val="black">
-                <a:alpha val="40000"/>
-              </a:prstClr>
-            </a:outerShdw>
-            <a:reflection blurRad="6350" stA="50000" endA="300" endPos="55000" dir="5400000" sy="-100000" algn="bl" rotWithShape="0"/>
-          </a:effectLst>
-        </p:spPr>
-        <p:style>
-          <a:lnRef idx="2">
-            <a:schemeClr val="accent1">
-              <a:shade val="50000"/>
-            </a:schemeClr>
-          </a:lnRef>
-          <a:fillRef idx="1">
-            <a:schemeClr val="accent1"/>
-          </a:fillRef>
-          <a:effectRef idx="0">
-            <a:schemeClr val="accent1"/>
-          </a:effectRef>
-          <a:fontRef idx="minor">
-            <a:schemeClr val="lt1"/>
-          </a:fontRef>
-        </p:style>
-        <p:txBody>
-          <a:bodyPr rtlCol="0" anchor="ctr"/>
-          <a:lstStyle/>
-          <a:p>
-            <a:pPr algn="ctr"/>
-            <a:endParaRPr lang="zh-CN" altLang="en-US"/>
-          </a:p>
-        </p:txBody>
-      </p:sp>
-      <p:sp>
-        <p:nvSpPr>
-          <p:cNvPr id="8" name="矩形 7"/>
-          <p:cNvSpPr/>
-          <p:nvPr/>
-        </p:nvSpPr>
-        <p:spPr>
-          <a:xfrm>
-            <a:off x="274382" y="1021263"/>
-            <a:ext cx="242354" cy="315898"/>
-          </a:xfrm>
-          <a:prstGeom prst="rect">
-            <a:avLst/>
-          </a:prstGeom>
-          <a:solidFill>
-            <a:srgbClr val="3C3C37"/>
-          </a:solidFill>
-          <a:ln>
-            <a:noFill/>
-          </a:ln>
-          <a:effectLst>
-            <a:outerShdw blurRad="50800" dist="38100" dir="5400000" algn="t" rotWithShape="0">
-              <a:prstClr val="black">
-                <a:alpha val="40000"/>
-              </a:prstClr>
-            </a:outerShdw>
-          </a:effectLst>
-        </p:spPr>
-        <p:style>
-          <a:lnRef idx="2">
-            <a:schemeClr val="accent1">
-              <a:shade val="50000"/>
-            </a:schemeClr>
-          </a:lnRef>
-          <a:fillRef idx="1">
-            <a:schemeClr val="accent1"/>
-          </a:fillRef>
-          <a:effectRef idx="0">
-            <a:schemeClr val="accent1"/>
-          </a:effectRef>
-          <a:fontRef idx="minor">
-            <a:schemeClr val="lt1"/>
-          </a:fontRef>
-        </p:style>
-        <p:txBody>
-          <a:bodyPr rtlCol="0" anchor="ctr"/>
-          <a:lstStyle/>
-          <a:p>
-            <a:pPr algn="ctr"/>
-            <a:endParaRPr lang="zh-CN" altLang="en-US"/>
-          </a:p>
-        </p:txBody>
-      </p:sp>
-      <p:sp>
-        <p:nvSpPr>
-          <p:cNvPr id="9" name="TextBox 8"/>
-          <p:cNvSpPr txBox="1"/>
-          <p:nvPr/>
-        </p:nvSpPr>
-        <p:spPr>
-          <a:xfrm>
-            <a:off x="539551" y="986852"/>
-            <a:ext cx="2701112" cy="384721"/>
-          </a:xfrm>
-          <a:prstGeom prst="rect">
-            <a:avLst/>
-          </a:prstGeom>
           <a:noFill/>
-          <a:effectLst/>
         </p:spPr>
         <p:txBody>
           <a:bodyPr wrap="square" rtlCol="0">
@@ -5353,35 +5246,209 @@
           </a:bodyPr>
           <a:lstStyle/>
           <a:p>
-            <a:pPr lvl="0"/>
-            <a:r>
-              <a:rPr lang="zh-CN" altLang="en-US" sz="1900" b="1" dirty="0" smtClean="0">
-                <a:solidFill>
-                  <a:schemeClr val="bg1"/>
-                </a:solidFill>
-                <a:effectLst>
-                  <a:outerShdw blurRad="38100" dist="38100" dir="2700000" algn="tl">
-                    <a:srgbClr val="000000">
-                      <a:alpha val="43137"/>
-                    </a:srgbClr>
-                  </a:outerShdw>
-                </a:effectLst>
-                <a:latin typeface="微软雅黑" panose="020B0503020204020204" pitchFamily="34" charset="-122"/>
-                <a:ea typeface="微软雅黑" panose="020B0503020204020204" pitchFamily="34" charset="-122"/>
-              </a:rPr>
-              <a:t>后端数据库</a:t>
-            </a:r>
-            <a:endParaRPr lang="zh-CN" altLang="zh-CN" sz="1900" b="1" dirty="0">
+            <a:pPr marL="285750" lvl="0" indent="-285750">
+              <a:lnSpc>
+                <a:spcPct val="150000"/>
+              </a:lnSpc>
+              <a:buFont typeface="Arial" panose="020B0604020202020204" pitchFamily="34" charset="0"/>
+              <a:buChar char="•"/>
+            </a:pPr>
+            <a:r>
+              <a:rPr lang="zh-CN" altLang="en-US" sz="1200" b="1" dirty="0" smtClean="0">
+                <a:solidFill>
+                  <a:schemeClr val="tx1">
+                    <a:lumMod val="75000"/>
+                    <a:lumOff val="25000"/>
+                  </a:schemeClr>
+                </a:solidFill>
+                <a:latin typeface="微软雅黑" panose="020B0503020204020204" pitchFamily="34" charset="-122"/>
+                <a:ea typeface="微软雅黑" panose="020B0503020204020204" pitchFamily="34" charset="-122"/>
+              </a:rPr>
+              <a:t>数据导入</a:t>
+            </a:r>
+            <a:endParaRPr lang="en-US" altLang="zh-CN" sz="1200" b="1" dirty="0" smtClean="0">
               <a:solidFill>
-                <a:schemeClr val="bg1"/>
+                <a:schemeClr val="tx1">
+                  <a:lumMod val="75000"/>
+                  <a:lumOff val="25000"/>
+                </a:schemeClr>
               </a:solidFill>
-              <a:effectLst>
-                <a:outerShdw blurRad="38100" dist="38100" dir="2700000" algn="tl">
-                  <a:srgbClr val="000000">
-                    <a:alpha val="43137"/>
-                  </a:srgbClr>
-                </a:outerShdw>
-              </a:effectLst>
+              <a:latin typeface="微软雅黑" panose="020B0503020204020204" pitchFamily="34" charset="-122"/>
+              <a:ea typeface="微软雅黑" panose="020B0503020204020204" pitchFamily="34" charset="-122"/>
+            </a:endParaRPr>
+          </a:p>
+          <a:p>
+            <a:pPr marL="285750" indent="-285750">
+              <a:lnSpc>
+                <a:spcPct val="150000"/>
+              </a:lnSpc>
+              <a:buFont typeface="Arial" panose="020B0604020202020204" pitchFamily="34" charset="0"/>
+              <a:buChar char="•"/>
+            </a:pPr>
+            <a:r>
+              <a:rPr lang="en-US" altLang="zh-CN" sz="1200" b="1" dirty="0">
+                <a:solidFill>
+                  <a:schemeClr val="tx1">
+                    <a:lumMod val="75000"/>
+                    <a:lumOff val="25000"/>
+                  </a:schemeClr>
+                </a:solidFill>
+                <a:latin typeface="微软雅黑" panose="020B0503020204020204" pitchFamily="34" charset="-122"/>
+                <a:ea typeface="微软雅黑" panose="020B0503020204020204" pitchFamily="34" charset="-122"/>
+              </a:rPr>
+              <a:t>Map</a:t>
+            </a:r>
+            <a:r>
+              <a:rPr lang="zh-CN" altLang="en-US" sz="1200" b="1" dirty="0">
+                <a:solidFill>
+                  <a:schemeClr val="tx1">
+                    <a:lumMod val="75000"/>
+                    <a:lumOff val="25000"/>
+                  </a:schemeClr>
+                </a:solidFill>
+                <a:latin typeface="微软雅黑" panose="020B0503020204020204" pitchFamily="34" charset="-122"/>
+                <a:ea typeface="微软雅黑" panose="020B0503020204020204" pitchFamily="34" charset="-122"/>
+              </a:rPr>
+              <a:t>等类的输出运算重载</a:t>
+            </a:r>
+          </a:p>
+          <a:p>
+            <a:pPr marL="285750" indent="-285750">
+              <a:lnSpc>
+                <a:spcPct val="150000"/>
+              </a:lnSpc>
+              <a:buFont typeface="Arial" panose="020B0604020202020204" pitchFamily="34" charset="0"/>
+              <a:buChar char="•"/>
+            </a:pPr>
+            <a:r>
+              <a:rPr lang="zh-CN" altLang="en-US" sz="1200" b="1" dirty="0">
+                <a:solidFill>
+                  <a:schemeClr val="tx1">
+                    <a:lumMod val="75000"/>
+                    <a:lumOff val="25000"/>
+                  </a:schemeClr>
+                </a:solidFill>
+                <a:latin typeface="微软雅黑" panose="020B0503020204020204" pitchFamily="34" charset="-122"/>
+                <a:ea typeface="微软雅黑" panose="020B0503020204020204" pitchFamily="34" charset="-122"/>
+              </a:rPr>
+              <a:t>二进制文件</a:t>
+            </a:r>
+            <a:r>
+              <a:rPr lang="zh-CN" altLang="en-US" sz="1200" b="1" dirty="0" smtClean="0">
+                <a:solidFill>
+                  <a:schemeClr val="tx1">
+                    <a:lumMod val="75000"/>
+                    <a:lumOff val="25000"/>
+                  </a:schemeClr>
+                </a:solidFill>
+                <a:latin typeface="微软雅黑" panose="020B0503020204020204" pitchFamily="34" charset="-122"/>
+                <a:ea typeface="微软雅黑" panose="020B0503020204020204" pitchFamily="34" charset="-122"/>
+              </a:rPr>
+              <a:t>读写</a:t>
+            </a:r>
+            <a:endParaRPr lang="en-US" altLang="zh-CN" sz="1200" b="1" dirty="0" smtClean="0">
+              <a:solidFill>
+                <a:schemeClr val="tx1">
+                  <a:lumMod val="75000"/>
+                  <a:lumOff val="25000"/>
+                </a:schemeClr>
+              </a:solidFill>
+              <a:latin typeface="微软雅黑" panose="020B0503020204020204" pitchFamily="34" charset="-122"/>
+              <a:ea typeface="微软雅黑" panose="020B0503020204020204" pitchFamily="34" charset="-122"/>
+            </a:endParaRPr>
+          </a:p>
+          <a:p>
+            <a:pPr marL="285750" lvl="0" indent="-285750">
+              <a:lnSpc>
+                <a:spcPct val="150000"/>
+              </a:lnSpc>
+              <a:buFont typeface="Arial" panose="020B0604020202020204" pitchFamily="34" charset="0"/>
+              <a:buChar char="•"/>
+            </a:pPr>
+            <a:r>
+              <a:rPr lang="zh-CN" altLang="en-US" sz="1200" b="1" dirty="0" smtClean="0">
+                <a:solidFill>
+                  <a:schemeClr val="tx1">
+                    <a:lumMod val="75000"/>
+                    <a:lumOff val="25000"/>
+                  </a:schemeClr>
+                </a:solidFill>
+                <a:latin typeface="微软雅黑" panose="020B0503020204020204" pitchFamily="34" charset="-122"/>
+                <a:ea typeface="微软雅黑" panose="020B0503020204020204" pitchFamily="34" charset="-122"/>
+              </a:rPr>
+              <a:t>类设计</a:t>
+            </a:r>
+            <a:endParaRPr lang="en-US" altLang="zh-CN" sz="1200" b="1" dirty="0" smtClean="0">
+              <a:solidFill>
+                <a:schemeClr val="tx1">
+                  <a:lumMod val="75000"/>
+                  <a:lumOff val="25000"/>
+                </a:schemeClr>
+              </a:solidFill>
+              <a:latin typeface="微软雅黑" panose="020B0503020204020204" pitchFamily="34" charset="-122"/>
+              <a:ea typeface="微软雅黑" panose="020B0503020204020204" pitchFamily="34" charset="-122"/>
+            </a:endParaRPr>
+          </a:p>
+          <a:p>
+            <a:pPr marL="285750" lvl="0" indent="-285750">
+              <a:lnSpc>
+                <a:spcPct val="150000"/>
+              </a:lnSpc>
+              <a:buFont typeface="Arial" panose="020B0604020202020204" pitchFamily="34" charset="0"/>
+              <a:buChar char="•"/>
+            </a:pPr>
+            <a:r>
+              <a:rPr lang="zh-CN" altLang="en-US" sz="1200" b="1" dirty="0" smtClean="0">
+                <a:solidFill>
+                  <a:schemeClr val="tx1">
+                    <a:lumMod val="75000"/>
+                    <a:lumOff val="25000"/>
+                  </a:schemeClr>
+                </a:solidFill>
+                <a:latin typeface="微软雅黑" panose="020B0503020204020204" pitchFamily="34" charset="-122"/>
+                <a:ea typeface="微软雅黑" panose="020B0503020204020204" pitchFamily="34" charset="-122"/>
+              </a:rPr>
+              <a:t>映射关系设计</a:t>
+            </a:r>
+            <a:endParaRPr lang="en-US" altLang="zh-CN" sz="1200" b="1" dirty="0" smtClean="0">
+              <a:solidFill>
+                <a:schemeClr val="tx1">
+                  <a:lumMod val="75000"/>
+                  <a:lumOff val="25000"/>
+                </a:schemeClr>
+              </a:solidFill>
+              <a:latin typeface="微软雅黑" panose="020B0503020204020204" pitchFamily="34" charset="-122"/>
+              <a:ea typeface="微软雅黑" panose="020B0503020204020204" pitchFamily="34" charset="-122"/>
+            </a:endParaRPr>
+          </a:p>
+          <a:p>
+            <a:pPr marL="285750" lvl="0" indent="-285750">
+              <a:lnSpc>
+                <a:spcPct val="150000"/>
+              </a:lnSpc>
+              <a:buFont typeface="Arial" panose="020B0604020202020204" pitchFamily="34" charset="0"/>
+              <a:buChar char="•"/>
+            </a:pPr>
+            <a:r>
+              <a:rPr lang="zh-CN" altLang="en-US" sz="1200" b="1" dirty="0" smtClean="0">
+                <a:solidFill>
+                  <a:schemeClr val="tx1">
+                    <a:lumMod val="75000"/>
+                    <a:lumOff val="25000"/>
+                  </a:schemeClr>
+                </a:solidFill>
+                <a:latin typeface="微软雅黑" panose="020B0503020204020204" pitchFamily="34" charset="-122"/>
+                <a:ea typeface="微软雅黑" panose="020B0503020204020204" pitchFamily="34" charset="-122"/>
+              </a:rPr>
+              <a:t>接口实现</a:t>
+            </a:r>
+            <a:endParaRPr lang="en-US" altLang="zh-CN" sz="1200" b="1" dirty="0" smtClean="0">
+              <a:solidFill>
+                <a:schemeClr val="tx1">
+                  <a:lumMod val="75000"/>
+                  <a:lumOff val="25000"/>
+                </a:schemeClr>
+              </a:solidFill>
               <a:latin typeface="微软雅黑" panose="020B0503020204020204" pitchFamily="34" charset="-122"/>
               <a:ea typeface="微软雅黑" panose="020B0503020204020204" pitchFamily="34" charset="-122"/>
             </a:endParaRPr>
@@ -5396,7 +5463,7 @@
         </p:nvGrpSpPr>
         <p:grpSpPr>
           <a:xfrm>
-            <a:off x="274384" y="2141444"/>
+            <a:off x="822410" y="3007132"/>
             <a:ext cx="2966281" cy="400110"/>
             <a:chOff x="274382" y="2645794"/>
             <a:chExt cx="2966281" cy="400110"/>
@@ -5576,109 +5643,6 @@
       </p:grpSp>
       <p:sp>
         <p:nvSpPr>
-          <p:cNvPr id="13" name="TextBox 12"/>
-          <p:cNvSpPr txBox="1"/>
-          <p:nvPr/>
-        </p:nvSpPr>
-        <p:spPr>
-          <a:xfrm>
-            <a:off x="251520" y="1463175"/>
-            <a:ext cx="3672408" cy="646331"/>
-          </a:xfrm>
-          <a:prstGeom prst="rect">
-            <a:avLst/>
-          </a:prstGeom>
-          <a:noFill/>
-        </p:spPr>
-        <p:txBody>
-          <a:bodyPr wrap="square" rtlCol="0">
-            <a:spAutoFit/>
-          </a:bodyPr>
-          <a:lstStyle/>
-          <a:p>
-            <a:pPr marL="285750" lvl="0" indent="-285750">
-              <a:lnSpc>
-                <a:spcPct val="150000"/>
-              </a:lnSpc>
-              <a:buFont typeface="Arial" panose="020B0604020202020204" pitchFamily="34" charset="0"/>
-              <a:buChar char="•"/>
-            </a:pPr>
-            <a:r>
-              <a:rPr lang="zh-CN" altLang="en-US" sz="1200" b="1" dirty="0" smtClean="0">
-                <a:solidFill>
-                  <a:schemeClr val="tx1">
-                    <a:lumMod val="75000"/>
-                    <a:lumOff val="25000"/>
-                  </a:schemeClr>
-                </a:solidFill>
-                <a:latin typeface="微软雅黑" panose="020B0503020204020204" pitchFamily="34" charset="-122"/>
-                <a:ea typeface="微软雅黑" panose="020B0503020204020204" pitchFamily="34" charset="-122"/>
-              </a:rPr>
-              <a:t>内容</a:t>
-            </a:r>
-            <a:r>
-              <a:rPr lang="en-US" altLang="zh-CN" sz="1200" b="1" dirty="0" smtClean="0">
-                <a:solidFill>
-                  <a:schemeClr val="tx1">
-                    <a:lumMod val="75000"/>
-                    <a:lumOff val="25000"/>
-                  </a:schemeClr>
-                </a:solidFill>
-                <a:latin typeface="微软雅黑" panose="020B0503020204020204" pitchFamily="34" charset="-122"/>
-                <a:ea typeface="微软雅黑" panose="020B0503020204020204" pitchFamily="34" charset="-122"/>
-              </a:rPr>
-              <a:t>1</a:t>
-            </a:r>
-          </a:p>
-          <a:p>
-            <a:pPr marL="285750" lvl="0" indent="-285750">
-              <a:lnSpc>
-                <a:spcPct val="150000"/>
-              </a:lnSpc>
-              <a:buFont typeface="Arial" panose="020B0604020202020204" pitchFamily="34" charset="0"/>
-              <a:buChar char="•"/>
-            </a:pPr>
-            <a:r>
-              <a:rPr lang="zh-CN" altLang="en-US" sz="1200" b="1" dirty="0" smtClean="0">
-                <a:solidFill>
-                  <a:schemeClr val="tx1">
-                    <a:lumMod val="75000"/>
-                    <a:lumOff val="25000"/>
-                  </a:schemeClr>
-                </a:solidFill>
-                <a:latin typeface="微软雅黑" panose="020B0503020204020204" pitchFamily="34" charset="-122"/>
-                <a:ea typeface="微软雅黑" panose="020B0503020204020204" pitchFamily="34" charset="-122"/>
-              </a:rPr>
-              <a:t>内容</a:t>
-            </a:r>
-            <a:r>
-              <a:rPr lang="en-US" altLang="zh-CN" sz="1200" b="1" dirty="0" smtClean="0">
-                <a:solidFill>
-                  <a:schemeClr val="tx1">
-                    <a:lumMod val="75000"/>
-                    <a:lumOff val="25000"/>
-                  </a:schemeClr>
-                </a:solidFill>
-                <a:latin typeface="微软雅黑" panose="020B0503020204020204" pitchFamily="34" charset="-122"/>
-                <a:ea typeface="微软雅黑" panose="020B0503020204020204" pitchFamily="34" charset="-122"/>
-              </a:rPr>
-              <a:t>2</a:t>
-            </a:r>
-            <a:endParaRPr lang="zh-CN" altLang="en-US" sz="1200" b="1" dirty="0">
-              <a:solidFill>
-                <a:schemeClr val="tx1">
-                  <a:lumMod val="75000"/>
-                  <a:lumOff val="25000"/>
-                </a:schemeClr>
-              </a:solidFill>
-              <a:latin typeface="微软雅黑" panose="020B0503020204020204" pitchFamily="34" charset="-122"/>
-              <a:ea typeface="微软雅黑" panose="020B0503020204020204" pitchFamily="34" charset="-122"/>
-            </a:endParaRPr>
-          </a:p>
-        </p:txBody>
-      </p:sp>
-      <p:sp>
-        <p:nvSpPr>
           <p:cNvPr id="18" name="矩形 17"/>
           <p:cNvSpPr/>
           <p:nvPr/>
@@ -5785,8 +5749,8 @@
         </p:nvSpPr>
         <p:spPr>
           <a:xfrm>
-            <a:off x="287522" y="2717507"/>
-            <a:ext cx="3672408" cy="646331"/>
+            <a:off x="822410" y="1787659"/>
+            <a:ext cx="3672408" cy="923330"/>
           </a:xfrm>
           <a:prstGeom prst="rect">
             <a:avLst/>
@@ -5817,21 +5781,18 @@
                 <a:latin typeface="微软雅黑" panose="020B0503020204020204" pitchFamily="34" charset="-122"/>
                 <a:ea typeface="微软雅黑" panose="020B0503020204020204" pitchFamily="34" charset="-122"/>
               </a:rPr>
-              <a:t>内容</a:t>
-            </a:r>
-            <a:r>
-              <a:rPr lang="en-US" altLang="zh-CN" sz="1200" b="1" dirty="0" smtClean="0">
-                <a:solidFill>
-                  <a:schemeClr val="tx1">
-                    <a:lumMod val="75000"/>
-                    <a:lumOff val="25000"/>
-                  </a:schemeClr>
-                </a:solidFill>
-                <a:latin typeface="微软雅黑" panose="020B0503020204020204" pitchFamily="34" charset="-122"/>
-                <a:ea typeface="微软雅黑" panose="020B0503020204020204" pitchFamily="34" charset="-122"/>
-              </a:rPr>
-              <a:t>1</a:t>
-            </a:r>
+              <a:t>窗口设计</a:t>
+            </a:r>
+            <a:endParaRPr lang="en-US" altLang="zh-CN" sz="1200" b="1" dirty="0" smtClean="0">
+              <a:solidFill>
+                <a:schemeClr val="tx1">
+                  <a:lumMod val="75000"/>
+                  <a:lumOff val="25000"/>
+                </a:schemeClr>
+              </a:solidFill>
+              <a:latin typeface="微软雅黑" panose="020B0503020204020204" pitchFamily="34" charset="-122"/>
+              <a:ea typeface="微软雅黑" panose="020B0503020204020204" pitchFamily="34" charset="-122"/>
+            </a:endParaRPr>
           </a:p>
           <a:p>
             <a:pPr marL="285750" lvl="0" indent="-285750">
@@ -5852,10 +5813,29 @@
                 <a:latin typeface="微软雅黑" panose="020B0503020204020204" pitchFamily="34" charset="-122"/>
                 <a:ea typeface="微软雅黑" panose="020B0503020204020204" pitchFamily="34" charset="-122"/>
               </a:rPr>
-              <a:t>内容</a:t>
-            </a:r>
-            <a:r>
-              <a:rPr lang="en-US" altLang="zh-CN" sz="1200" b="1" dirty="0" smtClean="0">
+              <a:t>窗口间关系设计</a:t>
+            </a:r>
+            <a:endParaRPr lang="en-US" altLang="zh-CN" sz="1200" b="1" dirty="0" smtClean="0">
+              <a:solidFill>
+                <a:schemeClr val="tx1">
+                  <a:lumMod val="75000"/>
+                  <a:lumOff val="25000"/>
+                </a:schemeClr>
+              </a:solidFill>
+              <a:latin typeface="微软雅黑" panose="020B0503020204020204" pitchFamily="34" charset="-122"/>
+              <a:ea typeface="微软雅黑" panose="020B0503020204020204" pitchFamily="34" charset="-122"/>
+            </a:endParaRPr>
+          </a:p>
+          <a:p>
+            <a:pPr marL="285750" lvl="0" indent="-285750">
+              <a:lnSpc>
+                <a:spcPct val="150000"/>
+              </a:lnSpc>
+              <a:buFont typeface="Arial" panose="020B0604020202020204" pitchFamily="34" charset="0"/>
+              <a:buChar char="•"/>
+            </a:pPr>
+            <a:r>
+              <a:rPr lang="zh-CN" altLang="en-US" sz="1200" b="1" dirty="0" smtClean="0">
                 <a:solidFill>
                   <a:schemeClr val="tx1">
                     <a:lumMod val="75000"/>
@@ -5865,7 +5845,7 @@
                 <a:latin typeface="微软雅黑" panose="020B0503020204020204" pitchFamily="34" charset="-122"/>
                 <a:ea typeface="微软雅黑" panose="020B0503020204020204" pitchFamily="34" charset="-122"/>
               </a:rPr>
-              <a:t>2</a:t>
+              <a:t>非法输入控制</a:t>
             </a:r>
             <a:endParaRPr lang="zh-CN" altLang="en-US" sz="1200" b="1" dirty="0">
               <a:solidFill>
@@ -5880,254 +5860,6 @@
           </a:p>
         </p:txBody>
       </p:sp>
-      <p:sp>
-        <p:nvSpPr>
-          <p:cNvPr id="32" name="矩形 31"/>
-          <p:cNvSpPr/>
-          <p:nvPr/>
-        </p:nvSpPr>
-        <p:spPr>
-          <a:xfrm>
-            <a:off x="4273675" y="986852"/>
-            <a:ext cx="2862091" cy="1573948"/>
-          </a:xfrm>
-          <a:prstGeom prst="rect">
-            <a:avLst/>
-          </a:prstGeom>
-          <a:solidFill>
-            <a:schemeClr val="bg1"/>
-          </a:solidFill>
-          <a:ln>
-            <a:noFill/>
-          </a:ln>
-        </p:spPr>
-        <p:style>
-          <a:lnRef idx="2">
-            <a:schemeClr val="accent1">
-              <a:shade val="50000"/>
-            </a:schemeClr>
-          </a:lnRef>
-          <a:fillRef idx="1">
-            <a:schemeClr val="accent1"/>
-          </a:fillRef>
-          <a:effectRef idx="0">
-            <a:schemeClr val="accent1"/>
-          </a:effectRef>
-          <a:fontRef idx="minor">
-            <a:schemeClr val="lt1"/>
-          </a:fontRef>
-        </p:style>
-        <p:txBody>
-          <a:bodyPr rtlCol="0" anchor="ctr"/>
-          <a:lstStyle/>
-          <a:p>
-            <a:pPr algn="ctr"/>
-            <a:r>
-              <a:rPr lang="zh-CN" altLang="en-US" b="1" dirty="0" smtClean="0">
-                <a:solidFill>
-                  <a:schemeClr val="tx1"/>
-                </a:solidFill>
-                <a:latin typeface="微软雅黑" panose="020B0503020204020204" pitchFamily="34" charset="-122"/>
-                <a:ea typeface="微软雅黑" panose="020B0503020204020204" pitchFamily="34" charset="-122"/>
-              </a:rPr>
-              <a:t>图片</a:t>
-            </a:r>
-            <a:endParaRPr lang="zh-CN" altLang="en-US" b="1" dirty="0">
-              <a:solidFill>
-                <a:schemeClr val="tx1"/>
-              </a:solidFill>
-              <a:latin typeface="微软雅黑" panose="020B0503020204020204" pitchFamily="34" charset="-122"/>
-              <a:ea typeface="微软雅黑" panose="020B0503020204020204" pitchFamily="34" charset="-122"/>
-            </a:endParaRPr>
-          </a:p>
-        </p:txBody>
-      </p:sp>
-      <p:sp>
-        <p:nvSpPr>
-          <p:cNvPr id="33" name="矩形 32"/>
-          <p:cNvSpPr/>
-          <p:nvPr/>
-        </p:nvSpPr>
-        <p:spPr>
-          <a:xfrm>
-            <a:off x="7351687" y="986852"/>
-            <a:ext cx="1512168" cy="1573948"/>
-          </a:xfrm>
-          <a:prstGeom prst="rect">
-            <a:avLst/>
-          </a:prstGeom>
-          <a:solidFill>
-            <a:schemeClr val="bg1"/>
-          </a:solidFill>
-          <a:ln>
-            <a:noFill/>
-          </a:ln>
-        </p:spPr>
-        <p:style>
-          <a:lnRef idx="2">
-            <a:schemeClr val="accent1">
-              <a:shade val="50000"/>
-            </a:schemeClr>
-          </a:lnRef>
-          <a:fillRef idx="1">
-            <a:schemeClr val="accent1"/>
-          </a:fillRef>
-          <a:effectRef idx="0">
-            <a:schemeClr val="accent1"/>
-          </a:effectRef>
-          <a:fontRef idx="minor">
-            <a:schemeClr val="lt1"/>
-          </a:fontRef>
-        </p:style>
-        <p:txBody>
-          <a:bodyPr rtlCol="0" anchor="ctr"/>
-          <a:lstStyle/>
-          <a:p>
-            <a:pPr algn="ctr"/>
-            <a:r>
-              <a:rPr lang="zh-CN" altLang="en-US" b="1" dirty="0" smtClean="0">
-                <a:solidFill>
-                  <a:schemeClr val="tx1"/>
-                </a:solidFill>
-                <a:latin typeface="微软雅黑" panose="020B0503020204020204" pitchFamily="34" charset="-122"/>
-                <a:ea typeface="微软雅黑" panose="020B0503020204020204" pitchFamily="34" charset="-122"/>
-              </a:rPr>
-              <a:t>图片</a:t>
-            </a:r>
-            <a:endParaRPr lang="zh-CN" altLang="en-US" b="1" dirty="0">
-              <a:solidFill>
-                <a:schemeClr val="tx1"/>
-              </a:solidFill>
-              <a:latin typeface="微软雅黑" panose="020B0503020204020204" pitchFamily="34" charset="-122"/>
-              <a:ea typeface="微软雅黑" panose="020B0503020204020204" pitchFamily="34" charset="-122"/>
-            </a:endParaRPr>
-          </a:p>
-        </p:txBody>
-      </p:sp>
-      <p:sp>
-        <p:nvSpPr>
-          <p:cNvPr id="34" name="矩形 33"/>
-          <p:cNvSpPr/>
-          <p:nvPr/>
-        </p:nvSpPr>
-        <p:spPr>
-          <a:xfrm>
-            <a:off x="4273675" y="2800329"/>
-            <a:ext cx="2862091" cy="1573948"/>
-          </a:xfrm>
-          <a:prstGeom prst="rect">
-            <a:avLst/>
-          </a:prstGeom>
-          <a:solidFill>
-            <a:schemeClr val="bg1"/>
-          </a:solidFill>
-          <a:ln>
-            <a:noFill/>
-          </a:ln>
-        </p:spPr>
-        <p:style>
-          <a:lnRef idx="2">
-            <a:schemeClr val="accent1">
-              <a:shade val="50000"/>
-            </a:schemeClr>
-          </a:lnRef>
-          <a:fillRef idx="1">
-            <a:schemeClr val="accent1"/>
-          </a:fillRef>
-          <a:effectRef idx="0">
-            <a:schemeClr val="accent1"/>
-          </a:effectRef>
-          <a:fontRef idx="minor">
-            <a:schemeClr val="lt1"/>
-          </a:fontRef>
-        </p:style>
-        <p:txBody>
-          <a:bodyPr rtlCol="0" anchor="ctr"/>
-          <a:lstStyle/>
-          <a:p>
-            <a:pPr algn="ctr"/>
-            <a:r>
-              <a:rPr lang="zh-CN" altLang="en-US" b="1" dirty="0" smtClean="0">
-                <a:solidFill>
-                  <a:schemeClr val="tx1"/>
-                </a:solidFill>
-                <a:latin typeface="微软雅黑" panose="020B0503020204020204" pitchFamily="34" charset="-122"/>
-                <a:ea typeface="微软雅黑" panose="020B0503020204020204" pitchFamily="34" charset="-122"/>
-              </a:rPr>
-              <a:t>图片</a:t>
-            </a:r>
-            <a:endParaRPr lang="zh-CN" altLang="en-US" b="1" dirty="0">
-              <a:solidFill>
-                <a:schemeClr val="tx1"/>
-              </a:solidFill>
-              <a:latin typeface="微软雅黑" panose="020B0503020204020204" pitchFamily="34" charset="-122"/>
-              <a:ea typeface="微软雅黑" panose="020B0503020204020204" pitchFamily="34" charset="-122"/>
-            </a:endParaRPr>
-          </a:p>
-        </p:txBody>
-      </p:sp>
-      <p:sp>
-        <p:nvSpPr>
-          <p:cNvPr id="35" name="矩形 34"/>
-          <p:cNvSpPr/>
-          <p:nvPr/>
-        </p:nvSpPr>
-        <p:spPr>
-          <a:xfrm>
-            <a:off x="7351687" y="2800329"/>
-            <a:ext cx="1512168" cy="1573948"/>
-          </a:xfrm>
-          <a:prstGeom prst="rect">
-            <a:avLst/>
-          </a:prstGeom>
-          <a:solidFill>
-            <a:schemeClr val="bg1"/>
-          </a:solidFill>
-          <a:ln>
-            <a:noFill/>
-          </a:ln>
-        </p:spPr>
-        <p:style>
-          <a:lnRef idx="2">
-            <a:schemeClr val="accent1">
-              <a:shade val="50000"/>
-            </a:schemeClr>
-          </a:lnRef>
-          <a:fillRef idx="1">
-            <a:schemeClr val="accent1"/>
-          </a:fillRef>
-          <a:effectRef idx="0">
-            <a:schemeClr val="accent1"/>
-          </a:effectRef>
-          <a:fontRef idx="minor">
-            <a:schemeClr val="lt1"/>
-          </a:fontRef>
-        </p:style>
-        <p:txBody>
-          <a:bodyPr rtlCol="0" anchor="ctr"/>
-          <a:lstStyle/>
-          <a:p>
-            <a:pPr algn="ctr"/>
-            <a:r>
-              <a:rPr lang="zh-CN" altLang="en-US" b="1" dirty="0" smtClean="0">
-                <a:solidFill>
-                  <a:schemeClr val="tx1"/>
-                </a:solidFill>
-                <a:latin typeface="微软雅黑" panose="020B0503020204020204" pitchFamily="34" charset="-122"/>
-                <a:ea typeface="微软雅黑" panose="020B0503020204020204" pitchFamily="34" charset="-122"/>
-              </a:rPr>
-              <a:t>图片</a:t>
-            </a:r>
-            <a:endParaRPr lang="zh-CN" altLang="en-US" b="1" dirty="0">
-              <a:solidFill>
-                <a:schemeClr val="tx1"/>
-              </a:solidFill>
-              <a:latin typeface="微软雅黑" panose="020B0503020204020204" pitchFamily="34" charset="-122"/>
-              <a:ea typeface="微软雅黑" panose="020B0503020204020204" pitchFamily="34" charset="-122"/>
-            </a:endParaRPr>
-          </a:p>
-        </p:txBody>
-      </p:sp>
       <p:grpSp>
         <p:nvGrpSpPr>
           <p:cNvPr id="23" name="组合 22"/>
@@ -6136,7 +5868,7 @@
         </p:nvGrpSpPr>
         <p:grpSpPr>
           <a:xfrm>
-            <a:off x="277756" y="3416682"/>
+            <a:off x="822410" y="1215682"/>
             <a:ext cx="2966281" cy="400110"/>
             <a:chOff x="274382" y="2645794"/>
             <a:chExt cx="2966281" cy="400110"/>
@@ -6280,6 +6012,23 @@
             <a:p>
               <a:pPr lvl="0"/>
               <a:r>
+                <a:rPr lang="en-US" altLang="zh-CN" sz="2000" b="1" dirty="0" smtClean="0">
+                  <a:solidFill>
+                    <a:schemeClr val="bg1"/>
+                  </a:solidFill>
+                  <a:effectLst>
+                    <a:outerShdw blurRad="38100" dist="38100" dir="2700000" algn="tl">
+                      <a:srgbClr val="000000">
+                        <a:alpha val="43137"/>
+                      </a:srgbClr>
+                    </a:outerShdw>
+                  </a:effectLst>
+                  <a:latin typeface="微软雅黑" panose="020B0503020204020204" pitchFamily="34" charset="-122"/>
+                  <a:ea typeface="微软雅黑" panose="020B0503020204020204" pitchFamily="34" charset="-122"/>
+                </a:rPr>
+                <a:t>UI</a:t>
+              </a:r>
+              <a:r>
                 <a:rPr lang="zh-CN" altLang="en-US" sz="2000" b="1" dirty="0" smtClean="0">
                   <a:solidFill>
                     <a:schemeClr val="bg1"/>
@@ -6294,7 +6043,7 @@
                   <a:latin typeface="微软雅黑" panose="020B0503020204020204" pitchFamily="34" charset="-122"/>
                   <a:ea typeface="微软雅黑" panose="020B0503020204020204" pitchFamily="34" charset="-122"/>
                 </a:rPr>
-                <a:t>服务器通信</a:t>
+                <a:t>设计</a:t>
               </a:r>
               <a:endParaRPr lang="zh-CN" altLang="zh-CN" sz="2000" b="1" dirty="0">
                 <a:solidFill>
@@ -6322,8 +6071,8 @@
         </p:nvSpPr>
         <p:spPr>
           <a:xfrm>
-            <a:off x="290894" y="3992745"/>
-            <a:ext cx="3672408" cy="646331"/>
+            <a:off x="824609" y="3615693"/>
+            <a:ext cx="3672408" cy="923330"/>
           </a:xfrm>
           <a:prstGeom prst="rect">
             <a:avLst/>
@@ -6354,21 +6103,18 @@
                 <a:latin typeface="微软雅黑" panose="020B0503020204020204" pitchFamily="34" charset="-122"/>
                 <a:ea typeface="微软雅黑" panose="020B0503020204020204" pitchFamily="34" charset="-122"/>
               </a:rPr>
-              <a:t>内容</a:t>
-            </a:r>
-            <a:r>
-              <a:rPr lang="en-US" altLang="zh-CN" sz="1200" b="1" dirty="0" smtClean="0">
-                <a:solidFill>
-                  <a:schemeClr val="tx1">
-                    <a:lumMod val="75000"/>
-                    <a:lumOff val="25000"/>
-                  </a:schemeClr>
-                </a:solidFill>
-                <a:latin typeface="微软雅黑" panose="020B0503020204020204" pitchFamily="34" charset="-122"/>
-                <a:ea typeface="微软雅黑" panose="020B0503020204020204" pitchFamily="34" charset="-122"/>
-              </a:rPr>
-              <a:t>1</a:t>
-            </a:r>
+              <a:t>通讯建立</a:t>
+            </a:r>
+            <a:endParaRPr lang="en-US" altLang="zh-CN" sz="1200" b="1" dirty="0" smtClean="0">
+              <a:solidFill>
+                <a:schemeClr val="tx1">
+                  <a:lumMod val="75000"/>
+                  <a:lumOff val="25000"/>
+                </a:schemeClr>
+              </a:solidFill>
+              <a:latin typeface="微软雅黑" panose="020B0503020204020204" pitchFamily="34" charset="-122"/>
+              <a:ea typeface="微软雅黑" panose="020B0503020204020204" pitchFamily="34" charset="-122"/>
+            </a:endParaRPr>
           </a:p>
           <a:p>
             <a:pPr marL="285750" lvl="0" indent="-285750">
@@ -6389,8 +6135,27 @@
                 <a:latin typeface="微软雅黑" panose="020B0503020204020204" pitchFamily="34" charset="-122"/>
                 <a:ea typeface="微软雅黑" panose="020B0503020204020204" pitchFamily="34" charset="-122"/>
               </a:rPr>
-              <a:t>内容</a:t>
-            </a:r>
+              <a:t>身份确认</a:t>
+            </a:r>
+            <a:endParaRPr lang="en-US" altLang="zh-CN" sz="1200" b="1" dirty="0" smtClean="0">
+              <a:solidFill>
+                <a:schemeClr val="tx1">
+                  <a:lumMod val="75000"/>
+                  <a:lumOff val="25000"/>
+                </a:schemeClr>
+              </a:solidFill>
+              <a:latin typeface="微软雅黑" panose="020B0503020204020204" pitchFamily="34" charset="-122"/>
+              <a:ea typeface="微软雅黑" panose="020B0503020204020204" pitchFamily="34" charset="-122"/>
+            </a:endParaRPr>
+          </a:p>
+          <a:p>
+            <a:pPr marL="285750" lvl="0" indent="-285750">
+              <a:lnSpc>
+                <a:spcPct val="150000"/>
+              </a:lnSpc>
+              <a:buFont typeface="Arial" panose="020B0604020202020204" pitchFamily="34" charset="0"/>
+              <a:buChar char="•"/>
+            </a:pPr>
             <a:r>
               <a:rPr lang="en-US" altLang="zh-CN" sz="1200" b="1" dirty="0" smtClean="0">
                 <a:solidFill>
@@ -6402,7 +6167,20 @@
                 <a:latin typeface="微软雅黑" panose="020B0503020204020204" pitchFamily="34" charset="-122"/>
                 <a:ea typeface="微软雅黑" panose="020B0503020204020204" pitchFamily="34" charset="-122"/>
               </a:rPr>
-              <a:t>2</a:t>
+              <a:t>UI</a:t>
+            </a:r>
+            <a:r>
+              <a:rPr lang="zh-CN" altLang="en-US" sz="1200" b="1" dirty="0" smtClean="0">
+                <a:solidFill>
+                  <a:schemeClr val="tx1">
+                    <a:lumMod val="75000"/>
+                    <a:lumOff val="25000"/>
+                  </a:schemeClr>
+                </a:solidFill>
+                <a:latin typeface="微软雅黑" panose="020B0503020204020204" pitchFamily="34" charset="-122"/>
+                <a:ea typeface="微软雅黑" panose="020B0503020204020204" pitchFamily="34" charset="-122"/>
+              </a:rPr>
+              <a:t>与数据库联动</a:t>
             </a:r>
             <a:endParaRPr lang="zh-CN" altLang="en-US" sz="1200" b="1" dirty="0">
               <a:solidFill>
@@ -6417,6 +6195,192 @@
           </a:p>
         </p:txBody>
       </p:sp>
+      <p:grpSp>
+        <p:nvGrpSpPr>
+          <p:cNvPr id="29" name="组合 28"/>
+          <p:cNvGrpSpPr/>
+          <p:nvPr/>
+        </p:nvGrpSpPr>
+        <p:grpSpPr>
+          <a:xfrm>
+            <a:off x="5339483" y="1819141"/>
+            <a:ext cx="2966281" cy="400110"/>
+            <a:chOff x="274382" y="2645794"/>
+            <a:chExt cx="2966281" cy="400110"/>
+          </a:xfrm>
+        </p:grpSpPr>
+        <p:sp>
+          <p:nvSpPr>
+            <p:cNvPr id="30" name="矩形 29"/>
+            <p:cNvSpPr/>
+            <p:nvPr/>
+          </p:nvSpPr>
+          <p:spPr>
+            <a:xfrm>
+              <a:off x="525553" y="2687900"/>
+              <a:ext cx="2715110" cy="315898"/>
+            </a:xfrm>
+            <a:prstGeom prst="rect">
+              <a:avLst/>
+            </a:prstGeom>
+            <a:solidFill>
+              <a:srgbClr val="FFC000"/>
+            </a:solidFill>
+            <a:ln>
+              <a:noFill/>
+            </a:ln>
+            <a:effectLst>
+              <a:outerShdw blurRad="50800" dist="38100" dir="5400000" algn="t" rotWithShape="0">
+                <a:prstClr val="black">
+                  <a:alpha val="40000"/>
+                </a:prstClr>
+              </a:outerShdw>
+              <a:reflection blurRad="6350" stA="50000" endA="300" endPos="55000" dir="5400000" sy="-100000" algn="bl" rotWithShape="0"/>
+            </a:effectLst>
+          </p:spPr>
+          <p:style>
+            <a:lnRef idx="2">
+              <a:schemeClr val="accent1">
+                <a:shade val="50000"/>
+              </a:schemeClr>
+            </a:lnRef>
+            <a:fillRef idx="1">
+              <a:schemeClr val="accent1"/>
+            </a:fillRef>
+            <a:effectRef idx="0">
+              <a:schemeClr val="accent1"/>
+            </a:effectRef>
+            <a:fontRef idx="minor">
+              <a:schemeClr val="lt1"/>
+            </a:fontRef>
+          </p:style>
+          <p:txBody>
+            <a:bodyPr rtlCol="0" anchor="ctr"/>
+            <a:lstStyle/>
+            <a:p>
+              <a:pPr algn="ctr"/>
+              <a:endParaRPr lang="zh-CN" altLang="en-US"/>
+            </a:p>
+          </p:txBody>
+        </p:sp>
+        <p:sp>
+          <p:nvSpPr>
+            <p:cNvPr id="36" name="矩形 35"/>
+            <p:cNvSpPr/>
+            <p:nvPr/>
+          </p:nvSpPr>
+          <p:spPr>
+            <a:xfrm>
+              <a:off x="274382" y="2687900"/>
+              <a:ext cx="242354" cy="315898"/>
+            </a:xfrm>
+            <a:prstGeom prst="rect">
+              <a:avLst/>
+            </a:prstGeom>
+            <a:solidFill>
+              <a:srgbClr val="3C3C37"/>
+            </a:solidFill>
+            <a:ln>
+              <a:noFill/>
+            </a:ln>
+            <a:effectLst>
+              <a:outerShdw blurRad="50800" dist="38100" dir="5400000" algn="t" rotWithShape="0">
+                <a:prstClr val="black">
+                  <a:alpha val="40000"/>
+                </a:prstClr>
+              </a:outerShdw>
+            </a:effectLst>
+          </p:spPr>
+          <p:style>
+            <a:lnRef idx="2">
+              <a:schemeClr val="accent1">
+                <a:shade val="50000"/>
+              </a:schemeClr>
+            </a:lnRef>
+            <a:fillRef idx="1">
+              <a:schemeClr val="accent1"/>
+            </a:fillRef>
+            <a:effectRef idx="0">
+              <a:schemeClr val="accent1"/>
+            </a:effectRef>
+            <a:fontRef idx="minor">
+              <a:schemeClr val="lt1"/>
+            </a:fontRef>
+          </p:style>
+          <p:txBody>
+            <a:bodyPr rtlCol="0" anchor="ctr"/>
+            <a:lstStyle/>
+            <a:p>
+              <a:pPr algn="ctr"/>
+              <a:endParaRPr lang="zh-CN" altLang="en-US"/>
+            </a:p>
+          </p:txBody>
+        </p:sp>
+        <p:sp>
+          <p:nvSpPr>
+            <p:cNvPr id="37" name="TextBox 11"/>
+            <p:cNvSpPr txBox="1"/>
+            <p:nvPr/>
+          </p:nvSpPr>
+          <p:spPr>
+            <a:xfrm>
+              <a:off x="516735" y="2645794"/>
+              <a:ext cx="2715111" cy="400110"/>
+            </a:xfrm>
+            <a:prstGeom prst="rect">
+              <a:avLst/>
+            </a:prstGeom>
+            <a:noFill/>
+            <a:effectLst>
+              <a:outerShdw blurRad="50800" dist="38100" dir="5400000" algn="t" rotWithShape="0">
+                <a:prstClr val="black">
+                  <a:alpha val="40000"/>
+                </a:prstClr>
+              </a:outerShdw>
+            </a:effectLst>
+          </p:spPr>
+          <p:txBody>
+            <a:bodyPr wrap="square" rtlCol="0">
+              <a:spAutoFit/>
+            </a:bodyPr>
+            <a:lstStyle/>
+            <a:p>
+              <a:pPr lvl="0"/>
+              <a:r>
+                <a:rPr lang="zh-CN" altLang="en-US" sz="2000" b="1" dirty="0" smtClean="0">
+                  <a:solidFill>
+                    <a:schemeClr val="bg1"/>
+                  </a:solidFill>
+                  <a:effectLst>
+                    <a:outerShdw blurRad="38100" dist="38100" dir="2700000" algn="tl">
+                      <a:srgbClr val="000000">
+                        <a:alpha val="43137"/>
+                      </a:srgbClr>
+                    </a:outerShdw>
+                  </a:effectLst>
+                  <a:latin typeface="微软雅黑" panose="020B0503020204020204" pitchFamily="34" charset="-122"/>
+                  <a:ea typeface="微软雅黑" panose="020B0503020204020204" pitchFamily="34" charset="-122"/>
+                </a:rPr>
+                <a:t>后端数据库</a:t>
+              </a:r>
+              <a:endParaRPr lang="en-US" altLang="zh-CN" sz="2000" b="1" dirty="0" smtClean="0">
+                <a:solidFill>
+                  <a:schemeClr val="bg1"/>
+                </a:solidFill>
+                <a:effectLst>
+                  <a:outerShdw blurRad="38100" dist="38100" dir="2700000" algn="tl">
+                    <a:srgbClr val="000000">
+                      <a:alpha val="43137"/>
+                    </a:srgbClr>
+                  </a:outerShdw>
+                </a:effectLst>
+                <a:latin typeface="微软雅黑" panose="020B0503020204020204" pitchFamily="34" charset="-122"/>
+                <a:ea typeface="微软雅黑" panose="020B0503020204020204" pitchFamily="34" charset="-122"/>
+              </a:endParaRPr>
+            </a:p>
+          </p:txBody>
+        </p:sp>
+      </p:grpSp>
     </p:spTree>
     <p:extLst>
       <p:ext uri="{BB962C8B-B14F-4D97-AF65-F5344CB8AC3E}">
@@ -6441,6 +6405,1188 @@
 </file>
 
 <file path=ppt/slides/slide12.xml><?xml version="1.0" encoding="utf-8"?>
+<p:sld xmlns:a="http://schemas.openxmlformats.org/drawingml/2006/main" xmlns:r="http://schemas.openxmlformats.org/officeDocument/2006/relationships" xmlns:p="http://schemas.openxmlformats.org/presentationml/2006/main">
+  <p:cSld>
+    <p:spTree>
+      <p:nvGrpSpPr>
+        <p:cNvPr id="1" name=""/>
+        <p:cNvGrpSpPr/>
+        <p:nvPr/>
+      </p:nvGrpSpPr>
+      <p:grpSpPr>
+        <a:xfrm>
+          <a:off x="0" y="0"/>
+          <a:ext cx="0" cy="0"/>
+          <a:chOff x="0" y="0"/>
+          <a:chExt cx="0" cy="0"/>
+        </a:xfrm>
+      </p:grpSpPr>
+      <p:sp>
+        <p:nvSpPr>
+          <p:cNvPr id="2" name="矩形 1"/>
+          <p:cNvSpPr/>
+          <p:nvPr/>
+        </p:nvSpPr>
+        <p:spPr>
+          <a:xfrm>
+            <a:off x="0" y="-35630"/>
+            <a:ext cx="9144000" cy="5271676"/>
+          </a:xfrm>
+          <a:prstGeom prst="rect">
+            <a:avLst/>
+          </a:prstGeom>
+          <a:solidFill>
+            <a:schemeClr val="dk1">
+              <a:alpha val="12000"/>
+            </a:schemeClr>
+          </a:solidFill>
+          <a:ln>
+            <a:noFill/>
+          </a:ln>
+        </p:spPr>
+        <p:style>
+          <a:lnRef idx="2">
+            <a:schemeClr val="dk1">
+              <a:shade val="50000"/>
+            </a:schemeClr>
+          </a:lnRef>
+          <a:fillRef idx="1">
+            <a:schemeClr val="dk1"/>
+          </a:fillRef>
+          <a:effectRef idx="0">
+            <a:schemeClr val="dk1"/>
+          </a:effectRef>
+          <a:fontRef idx="minor">
+            <a:schemeClr val="lt1"/>
+          </a:fontRef>
+        </p:style>
+        <p:txBody>
+          <a:bodyPr rtlCol="0" anchor="ctr"/>
+          <a:lstStyle/>
+          <a:p>
+            <a:pPr algn="ctr"/>
+            <a:endParaRPr lang="zh-CN" altLang="en-US"/>
+          </a:p>
+        </p:txBody>
+      </p:sp>
+      <p:cxnSp>
+        <p:nvCxnSpPr>
+          <p:cNvPr id="3" name="直接连接符 2"/>
+          <p:cNvCxnSpPr/>
+          <p:nvPr/>
+        </p:nvCxnSpPr>
+        <p:spPr bwMode="auto">
+          <a:xfrm>
+            <a:off x="179512" y="714067"/>
+            <a:ext cx="8712968" cy="0"/>
+          </a:xfrm>
+          <a:prstGeom prst="line">
+            <a:avLst/>
+          </a:prstGeom>
+          <a:ln>
+            <a:solidFill>
+              <a:schemeClr val="bg1">
+                <a:lumMod val="65000"/>
+              </a:schemeClr>
+            </a:solidFill>
+          </a:ln>
+          <a:effectLst>
+            <a:outerShdw blurRad="12700" dist="12700" dir="5400000" algn="t" rotWithShape="0">
+              <a:schemeClr val="bg1"/>
+            </a:outerShdw>
+          </a:effectLst>
+        </p:spPr>
+        <p:style>
+          <a:lnRef idx="1">
+            <a:schemeClr val="accent1"/>
+          </a:lnRef>
+          <a:fillRef idx="0">
+            <a:schemeClr val="accent1"/>
+          </a:fillRef>
+          <a:effectRef idx="0">
+            <a:schemeClr val="accent1"/>
+          </a:effectRef>
+          <a:fontRef idx="minor">
+            <a:schemeClr val="tx1"/>
+          </a:fontRef>
+        </p:style>
+      </p:cxnSp>
+      <p:sp>
+        <p:nvSpPr>
+          <p:cNvPr id="4" name="TextBox 3"/>
+          <p:cNvSpPr txBox="1"/>
+          <p:nvPr/>
+        </p:nvSpPr>
+        <p:spPr>
+          <a:xfrm>
+            <a:off x="287522" y="225980"/>
+            <a:ext cx="782416" cy="400110"/>
+          </a:xfrm>
+          <a:prstGeom prst="rect">
+            <a:avLst/>
+          </a:prstGeom>
+          <a:noFill/>
+        </p:spPr>
+        <p:txBody>
+          <a:bodyPr wrap="square" rtlCol="0">
+            <a:spAutoFit/>
+          </a:bodyPr>
+          <a:lstStyle/>
+          <a:p>
+            <a:pPr lvl="0" algn="r"/>
+            <a:r>
+              <a:rPr lang="en-US" altLang="zh-CN" sz="2000" b="1" dirty="0" smtClean="0">
+                <a:solidFill>
+                  <a:schemeClr val="tx1">
+                    <a:lumMod val="75000"/>
+                    <a:lumOff val="25000"/>
+                  </a:schemeClr>
+                </a:solidFill>
+                <a:latin typeface="微软雅黑" panose="020B0503020204020204" pitchFamily="34" charset="-122"/>
+                <a:ea typeface="微软雅黑" panose="020B0503020204020204" pitchFamily="34" charset="-122"/>
+              </a:rPr>
+              <a:t>02</a:t>
+            </a:r>
+            <a:endParaRPr lang="zh-CN" altLang="zh-CN" sz="2000" b="1" dirty="0">
+              <a:solidFill>
+                <a:schemeClr val="tx1">
+                  <a:lumMod val="75000"/>
+                  <a:lumOff val="25000"/>
+                </a:schemeClr>
+              </a:solidFill>
+              <a:latin typeface="微软雅黑" panose="020B0503020204020204" pitchFamily="34" charset="-122"/>
+              <a:ea typeface="微软雅黑" panose="020B0503020204020204" pitchFamily="34" charset="-122"/>
+            </a:endParaRPr>
+          </a:p>
+        </p:txBody>
+      </p:sp>
+      <p:cxnSp>
+        <p:nvCxnSpPr>
+          <p:cNvPr id="5" name="直接连接符 4"/>
+          <p:cNvCxnSpPr/>
+          <p:nvPr/>
+        </p:nvCxnSpPr>
+        <p:spPr bwMode="auto">
+          <a:xfrm flipV="1">
+            <a:off x="1069938" y="282019"/>
+            <a:ext cx="0" cy="288032"/>
+          </a:xfrm>
+          <a:prstGeom prst="line">
+            <a:avLst/>
+          </a:prstGeom>
+          <a:ln w="19050">
+            <a:solidFill>
+              <a:schemeClr val="tx1">
+                <a:lumMod val="65000"/>
+                <a:lumOff val="35000"/>
+              </a:schemeClr>
+            </a:solidFill>
+          </a:ln>
+          <a:effectLst>
+            <a:outerShdw blurRad="12700" dist="12700" dir="5400000" algn="t" rotWithShape="0">
+              <a:schemeClr val="bg1"/>
+            </a:outerShdw>
+          </a:effectLst>
+        </p:spPr>
+        <p:style>
+          <a:lnRef idx="1">
+            <a:schemeClr val="accent1"/>
+          </a:lnRef>
+          <a:fillRef idx="0">
+            <a:schemeClr val="accent1"/>
+          </a:fillRef>
+          <a:effectRef idx="0">
+            <a:schemeClr val="accent1"/>
+          </a:effectRef>
+          <a:fontRef idx="minor">
+            <a:schemeClr val="tx1"/>
+          </a:fontRef>
+        </p:style>
+      </p:cxnSp>
+      <p:sp>
+        <p:nvSpPr>
+          <p:cNvPr id="6" name="TextBox 4"/>
+          <p:cNvSpPr txBox="1"/>
+          <p:nvPr/>
+        </p:nvSpPr>
+        <p:spPr>
+          <a:xfrm>
+            <a:off x="1083644" y="241369"/>
+            <a:ext cx="2304256" cy="369332"/>
+          </a:xfrm>
+          <a:prstGeom prst="rect">
+            <a:avLst/>
+          </a:prstGeom>
+          <a:noFill/>
+        </p:spPr>
+        <p:txBody>
+          <a:bodyPr wrap="square" rtlCol="0">
+            <a:spAutoFit/>
+          </a:bodyPr>
+          <a:lstStyle/>
+          <a:p>
+            <a:pPr lvl="0"/>
+            <a:r>
+              <a:rPr lang="zh-CN" altLang="en-US" b="1" dirty="0" smtClean="0">
+                <a:solidFill>
+                  <a:schemeClr val="tx1">
+                    <a:lumMod val="75000"/>
+                    <a:lumOff val="25000"/>
+                  </a:schemeClr>
+                </a:solidFill>
+                <a:latin typeface="微软雅黑" panose="020B0503020204020204" pitchFamily="34" charset="-122"/>
+                <a:ea typeface="微软雅黑" panose="020B0503020204020204" pitchFamily="34" charset="-122"/>
+              </a:rPr>
+              <a:t>制作中的问题</a:t>
+            </a:r>
+            <a:endParaRPr lang="zh-CN" altLang="en-US" b="1" dirty="0">
+              <a:solidFill>
+                <a:schemeClr val="tx1">
+                  <a:lumMod val="75000"/>
+                  <a:lumOff val="25000"/>
+                </a:schemeClr>
+              </a:solidFill>
+              <a:latin typeface="微软雅黑" panose="020B0503020204020204" pitchFamily="34" charset="-122"/>
+              <a:ea typeface="微软雅黑" panose="020B0503020204020204" pitchFamily="34" charset="-122"/>
+            </a:endParaRPr>
+          </a:p>
+        </p:txBody>
+      </p:sp>
+      <p:sp>
+        <p:nvSpPr>
+          <p:cNvPr id="7" name="TextBox 5"/>
+          <p:cNvSpPr txBox="1"/>
+          <p:nvPr/>
+        </p:nvSpPr>
+        <p:spPr>
+          <a:xfrm>
+            <a:off x="7370018" y="-35631"/>
+            <a:ext cx="1512168" cy="923330"/>
+          </a:xfrm>
+          <a:prstGeom prst="rect">
+            <a:avLst/>
+          </a:prstGeom>
+          <a:noFill/>
+          <a:effectLst>
+            <a:outerShdw blurRad="50800" dist="38100" dir="5400000" algn="t" rotWithShape="0">
+              <a:prstClr val="black">
+                <a:alpha val="40000"/>
+              </a:prstClr>
+            </a:outerShdw>
+          </a:effectLst>
+        </p:spPr>
+        <p:txBody>
+          <a:bodyPr wrap="square" rtlCol="0">
+            <a:spAutoFit/>
+          </a:bodyPr>
+          <a:lstStyle/>
+          <a:p>
+            <a:pPr lvl="0" algn="dist"/>
+            <a:r>
+              <a:rPr lang="en-US" altLang="zh-CN" sz="5400" b="1" dirty="0" smtClean="0">
+                <a:solidFill>
+                  <a:srgbClr val="05AFC8"/>
+                </a:solidFill>
+                <a:latin typeface="微软雅黑" panose="020B0503020204020204" pitchFamily="34" charset="-122"/>
+                <a:ea typeface="微软雅黑" panose="020B0503020204020204" pitchFamily="34" charset="-122"/>
+              </a:rPr>
+              <a:t>·</a:t>
+            </a:r>
+            <a:r>
+              <a:rPr lang="en-US" altLang="zh-CN" sz="5400" b="1" dirty="0" smtClean="0">
+                <a:solidFill>
+                  <a:schemeClr val="tx1">
+                    <a:lumMod val="75000"/>
+                    <a:lumOff val="25000"/>
+                  </a:schemeClr>
+                </a:solidFill>
+                <a:latin typeface="微软雅黑" panose="020B0503020204020204" pitchFamily="34" charset="-122"/>
+                <a:ea typeface="微软雅黑" panose="020B0503020204020204" pitchFamily="34" charset="-122"/>
+              </a:rPr>
+              <a:t> </a:t>
+            </a:r>
+            <a:r>
+              <a:rPr lang="en-US" altLang="zh-CN" sz="5400" b="1" dirty="0" smtClean="0">
+                <a:solidFill>
+                  <a:srgbClr val="FFC000"/>
+                </a:solidFill>
+                <a:latin typeface="微软雅黑" panose="020B0503020204020204" pitchFamily="34" charset="-122"/>
+                <a:ea typeface="微软雅黑" panose="020B0503020204020204" pitchFamily="34" charset="-122"/>
+              </a:rPr>
+              <a:t>·</a:t>
+            </a:r>
+            <a:r>
+              <a:rPr lang="en-US" altLang="zh-CN" sz="5400" b="1" dirty="0" smtClean="0">
+                <a:solidFill>
+                  <a:schemeClr val="tx1">
+                    <a:lumMod val="75000"/>
+                    <a:lumOff val="25000"/>
+                  </a:schemeClr>
+                </a:solidFill>
+                <a:latin typeface="微软雅黑" panose="020B0503020204020204" pitchFamily="34" charset="-122"/>
+                <a:ea typeface="微软雅黑" panose="020B0503020204020204" pitchFamily="34" charset="-122"/>
+              </a:rPr>
+              <a:t> </a:t>
+            </a:r>
+            <a:r>
+              <a:rPr lang="en-US" altLang="zh-CN" sz="5400" b="1" dirty="0" smtClean="0">
+                <a:solidFill>
+                  <a:srgbClr val="FA4453"/>
+                </a:solidFill>
+                <a:latin typeface="微软雅黑" panose="020B0503020204020204" pitchFamily="34" charset="-122"/>
+                <a:ea typeface="微软雅黑" panose="020B0503020204020204" pitchFamily="34" charset="-122"/>
+              </a:rPr>
+              <a:t>·</a:t>
+            </a:r>
+            <a:endParaRPr lang="zh-CN" altLang="zh-CN" sz="5400" b="1" dirty="0">
+              <a:solidFill>
+                <a:srgbClr val="FA4453"/>
+              </a:solidFill>
+              <a:latin typeface="微软雅黑" panose="020B0503020204020204" pitchFamily="34" charset="-122"/>
+              <a:ea typeface="微软雅黑" panose="020B0503020204020204" pitchFamily="34" charset="-122"/>
+            </a:endParaRPr>
+          </a:p>
+        </p:txBody>
+      </p:sp>
+      <p:sp>
+        <p:nvSpPr>
+          <p:cNvPr id="8" name="矩形 7"/>
+          <p:cNvSpPr/>
+          <p:nvPr/>
+        </p:nvSpPr>
+        <p:spPr>
+          <a:xfrm>
+            <a:off x="0" y="5092031"/>
+            <a:ext cx="9144000" cy="144016"/>
+          </a:xfrm>
+          <a:prstGeom prst="rect">
+            <a:avLst/>
+          </a:prstGeom>
+          <a:solidFill>
+            <a:srgbClr val="FFC000"/>
+          </a:solidFill>
+          <a:ln>
+            <a:noFill/>
+          </a:ln>
+          <a:effectLst>
+            <a:outerShdw blurRad="50800" dist="38100" dir="5400000" algn="t" rotWithShape="0">
+              <a:prstClr val="black">
+                <a:alpha val="40000"/>
+              </a:prstClr>
+            </a:outerShdw>
+          </a:effectLst>
+        </p:spPr>
+        <p:style>
+          <a:lnRef idx="2">
+            <a:schemeClr val="accent1">
+              <a:shade val="50000"/>
+            </a:schemeClr>
+          </a:lnRef>
+          <a:fillRef idx="1">
+            <a:schemeClr val="accent1"/>
+          </a:fillRef>
+          <a:effectRef idx="0">
+            <a:schemeClr val="accent1"/>
+          </a:effectRef>
+          <a:fontRef idx="minor">
+            <a:schemeClr val="lt1"/>
+          </a:fontRef>
+        </p:style>
+        <p:txBody>
+          <a:bodyPr rtlCol="0" anchor="ctr"/>
+          <a:lstStyle/>
+          <a:p>
+            <a:pPr algn="ctr"/>
+            <a:endParaRPr lang="zh-CN" altLang="en-US"/>
+          </a:p>
+        </p:txBody>
+      </p:sp>
+      <p:sp>
+        <p:nvSpPr>
+          <p:cNvPr id="9" name="流程图: 合并 8"/>
+          <p:cNvSpPr/>
+          <p:nvPr/>
+        </p:nvSpPr>
+        <p:spPr>
+          <a:xfrm rot="16200000">
+            <a:off x="147158" y="281205"/>
+            <a:ext cx="360039" cy="240025"/>
+          </a:xfrm>
+          <a:prstGeom prst="flowChartMerge">
+            <a:avLst/>
+          </a:prstGeom>
+          <a:noFill/>
+          <a:ln w="6350">
+            <a:solidFill>
+              <a:schemeClr val="bg1">
+                <a:lumMod val="50000"/>
+              </a:schemeClr>
+            </a:solidFill>
+            <a:prstDash val="sysDash"/>
+          </a:ln>
+        </p:spPr>
+        <p:style>
+          <a:lnRef idx="2">
+            <a:schemeClr val="dk1"/>
+          </a:lnRef>
+          <a:fillRef idx="1">
+            <a:schemeClr val="lt1"/>
+          </a:fillRef>
+          <a:effectRef idx="0">
+            <a:schemeClr val="dk1"/>
+          </a:effectRef>
+          <a:fontRef idx="minor">
+            <a:schemeClr val="dk1"/>
+          </a:fontRef>
+        </p:style>
+        <p:txBody>
+          <a:bodyPr rtlCol="0" anchor="ctr"/>
+          <a:lstStyle/>
+          <a:p>
+            <a:pPr algn="ctr"/>
+            <a:endParaRPr lang="zh-CN" altLang="en-US"/>
+          </a:p>
+        </p:txBody>
+      </p:sp>
+      <p:sp>
+        <p:nvSpPr>
+          <p:cNvPr id="10" name="流程图: 联系 9"/>
+          <p:cNvSpPr/>
+          <p:nvPr/>
+        </p:nvSpPr>
+        <p:spPr>
+          <a:xfrm>
+            <a:off x="541063" y="1419622"/>
+            <a:ext cx="1296144" cy="1296144"/>
+          </a:xfrm>
+          <a:prstGeom prst="flowChartConnector">
+            <a:avLst/>
+          </a:prstGeom>
+          <a:solidFill>
+            <a:srgbClr val="FFC000"/>
+          </a:solidFill>
+          <a:ln>
+            <a:solidFill>
+              <a:srgbClr val="FFC000"/>
+            </a:solidFill>
+          </a:ln>
+        </p:spPr>
+        <p:style>
+          <a:lnRef idx="2">
+            <a:schemeClr val="accent1">
+              <a:shade val="50000"/>
+            </a:schemeClr>
+          </a:lnRef>
+          <a:fillRef idx="1">
+            <a:schemeClr val="accent1"/>
+          </a:fillRef>
+          <a:effectRef idx="0">
+            <a:schemeClr val="accent1"/>
+          </a:effectRef>
+          <a:fontRef idx="minor">
+            <a:schemeClr val="lt1"/>
+          </a:fontRef>
+        </p:style>
+        <p:txBody>
+          <a:bodyPr rtlCol="0" anchor="ctr"/>
+          <a:lstStyle/>
+          <a:p>
+            <a:pPr algn="ctr"/>
+            <a:r>
+              <a:rPr lang="zh-CN" altLang="en-US" b="1" dirty="0">
+                <a:latin typeface="微软雅黑" panose="020B0503020204020204" pitchFamily="34" charset="-122"/>
+                <a:ea typeface="微软雅黑" panose="020B0503020204020204" pitchFamily="34" charset="-122"/>
+              </a:rPr>
+              <a:t>观光</a:t>
+            </a:r>
+            <a:r>
+              <a:rPr lang="zh-CN" altLang="en-US" b="1" dirty="0" smtClean="0">
+                <a:latin typeface="微软雅黑" panose="020B0503020204020204" pitchFamily="34" charset="-122"/>
+                <a:ea typeface="微软雅黑" panose="020B0503020204020204" pitchFamily="34" charset="-122"/>
+              </a:rPr>
+              <a:t>车难题</a:t>
+            </a:r>
+            <a:endParaRPr lang="zh-CN" altLang="en-US" b="1" dirty="0">
+              <a:latin typeface="微软雅黑" panose="020B0503020204020204" pitchFamily="34" charset="-122"/>
+              <a:ea typeface="微软雅黑" panose="020B0503020204020204" pitchFamily="34" charset="-122"/>
+            </a:endParaRPr>
+          </a:p>
+        </p:txBody>
+      </p:sp>
+      <p:sp>
+        <p:nvSpPr>
+          <p:cNvPr id="11" name="流程图: 联系 10"/>
+          <p:cNvSpPr/>
+          <p:nvPr/>
+        </p:nvSpPr>
+        <p:spPr>
+          <a:xfrm>
+            <a:off x="2627784" y="3255786"/>
+            <a:ext cx="1296144" cy="1296144"/>
+          </a:xfrm>
+          <a:prstGeom prst="flowChartConnector">
+            <a:avLst/>
+          </a:prstGeom>
+          <a:solidFill>
+            <a:srgbClr val="FFC000"/>
+          </a:solidFill>
+          <a:ln>
+            <a:solidFill>
+              <a:srgbClr val="FFC000"/>
+            </a:solidFill>
+          </a:ln>
+        </p:spPr>
+        <p:style>
+          <a:lnRef idx="2">
+            <a:schemeClr val="accent1">
+              <a:shade val="50000"/>
+            </a:schemeClr>
+          </a:lnRef>
+          <a:fillRef idx="1">
+            <a:schemeClr val="accent1"/>
+          </a:fillRef>
+          <a:effectRef idx="0">
+            <a:schemeClr val="accent1"/>
+          </a:effectRef>
+          <a:fontRef idx="minor">
+            <a:schemeClr val="lt1"/>
+          </a:fontRef>
+        </p:style>
+        <p:txBody>
+          <a:bodyPr rtlCol="0" anchor="ctr"/>
+          <a:lstStyle/>
+          <a:p>
+            <a:pPr algn="ctr"/>
+            <a:r>
+              <a:rPr lang="zh-CN" altLang="en-US" b="1" dirty="0">
+                <a:latin typeface="微软雅黑" panose="020B0503020204020204" pitchFamily="34" charset="-122"/>
+                <a:ea typeface="微软雅黑" panose="020B0503020204020204" pitchFamily="34" charset="-122"/>
+              </a:rPr>
+              <a:t>锟斤</a:t>
+            </a:r>
+            <a:r>
+              <a:rPr lang="zh-CN" altLang="en-US" b="1" dirty="0" smtClean="0">
+                <a:latin typeface="微软雅黑" panose="020B0503020204020204" pitchFamily="34" charset="-122"/>
+                <a:ea typeface="微软雅黑" panose="020B0503020204020204" pitchFamily="34" charset="-122"/>
+              </a:rPr>
+              <a:t>拷</a:t>
+            </a:r>
+            <a:endParaRPr lang="en-US" altLang="zh-CN" b="1" dirty="0" smtClean="0">
+              <a:latin typeface="微软雅黑" panose="020B0503020204020204" pitchFamily="34" charset="-122"/>
+              <a:ea typeface="微软雅黑" panose="020B0503020204020204" pitchFamily="34" charset="-122"/>
+            </a:endParaRPr>
+          </a:p>
+          <a:p>
+            <a:pPr algn="ctr"/>
+            <a:r>
+              <a:rPr lang="zh-CN" altLang="en-US" b="1" dirty="0">
+                <a:latin typeface="微软雅黑" panose="020B0503020204020204" pitchFamily="34" charset="-122"/>
+                <a:ea typeface="微软雅黑" panose="020B0503020204020204" pitchFamily="34" charset="-122"/>
+              </a:rPr>
+              <a:t>困境</a:t>
+            </a:r>
+            <a:endParaRPr lang="zh-CN" altLang="en-US" b="1" dirty="0">
+              <a:latin typeface="微软雅黑" panose="020B0503020204020204" pitchFamily="34" charset="-122"/>
+              <a:ea typeface="微软雅黑" panose="020B0503020204020204" pitchFamily="34" charset="-122"/>
+            </a:endParaRPr>
+          </a:p>
+        </p:txBody>
+      </p:sp>
+      <p:sp>
+        <p:nvSpPr>
+          <p:cNvPr id="12" name="流程图: 联系 11"/>
+          <p:cNvSpPr/>
+          <p:nvPr/>
+        </p:nvSpPr>
+        <p:spPr>
+          <a:xfrm>
+            <a:off x="4827652" y="1419622"/>
+            <a:ext cx="1296144" cy="1296144"/>
+          </a:xfrm>
+          <a:prstGeom prst="flowChartConnector">
+            <a:avLst/>
+          </a:prstGeom>
+          <a:solidFill>
+            <a:srgbClr val="FFC000"/>
+          </a:solidFill>
+          <a:ln>
+            <a:solidFill>
+              <a:srgbClr val="FFC000"/>
+            </a:solidFill>
+          </a:ln>
+        </p:spPr>
+        <p:style>
+          <a:lnRef idx="2">
+            <a:schemeClr val="accent1">
+              <a:shade val="50000"/>
+            </a:schemeClr>
+          </a:lnRef>
+          <a:fillRef idx="1">
+            <a:schemeClr val="accent1"/>
+          </a:fillRef>
+          <a:effectRef idx="0">
+            <a:schemeClr val="accent1"/>
+          </a:effectRef>
+          <a:fontRef idx="minor">
+            <a:schemeClr val="lt1"/>
+          </a:fontRef>
+        </p:style>
+        <p:txBody>
+          <a:bodyPr rtlCol="0" anchor="ctr"/>
+          <a:lstStyle/>
+          <a:p>
+            <a:pPr algn="ctr"/>
+            <a:r>
+              <a:rPr lang="zh-CN" altLang="en-US" b="1" dirty="0" smtClean="0">
+                <a:latin typeface="微软雅黑" panose="020B0503020204020204" pitchFamily="34" charset="-122"/>
+                <a:ea typeface="微软雅黑" panose="020B0503020204020204" pitchFamily="34" charset="-122"/>
+              </a:rPr>
+              <a:t>前后端连线</a:t>
+            </a:r>
+            <a:endParaRPr lang="zh-CN" altLang="en-US" b="1" dirty="0">
+              <a:latin typeface="微软雅黑" panose="020B0503020204020204" pitchFamily="34" charset="-122"/>
+              <a:ea typeface="微软雅黑" panose="020B0503020204020204" pitchFamily="34" charset="-122"/>
+            </a:endParaRPr>
+          </a:p>
+        </p:txBody>
+      </p:sp>
+      <p:sp>
+        <p:nvSpPr>
+          <p:cNvPr id="13" name="流程图: 联系 12"/>
+          <p:cNvSpPr/>
+          <p:nvPr/>
+        </p:nvSpPr>
+        <p:spPr>
+          <a:xfrm>
+            <a:off x="7020272" y="3255786"/>
+            <a:ext cx="1296144" cy="1296144"/>
+          </a:xfrm>
+          <a:prstGeom prst="flowChartConnector">
+            <a:avLst/>
+          </a:prstGeom>
+          <a:solidFill>
+            <a:srgbClr val="FFC000"/>
+          </a:solidFill>
+          <a:ln>
+            <a:solidFill>
+              <a:srgbClr val="FFC000"/>
+            </a:solidFill>
+          </a:ln>
+        </p:spPr>
+        <p:style>
+          <a:lnRef idx="2">
+            <a:schemeClr val="accent1">
+              <a:shade val="50000"/>
+            </a:schemeClr>
+          </a:lnRef>
+          <a:fillRef idx="1">
+            <a:schemeClr val="accent1"/>
+          </a:fillRef>
+          <a:effectRef idx="0">
+            <a:schemeClr val="accent1"/>
+          </a:effectRef>
+          <a:fontRef idx="minor">
+            <a:schemeClr val="lt1"/>
+          </a:fontRef>
+        </p:style>
+        <p:txBody>
+          <a:bodyPr rtlCol="0" anchor="ctr"/>
+          <a:lstStyle/>
+          <a:p>
+            <a:pPr algn="ctr"/>
+            <a:r>
+              <a:rPr lang="en-US" altLang="zh-CN" b="1" dirty="0" smtClean="0">
+                <a:latin typeface="微软雅黑" panose="020B0503020204020204" pitchFamily="34" charset="-122"/>
+                <a:ea typeface="微软雅黑" panose="020B0503020204020204" pitchFamily="34" charset="-122"/>
+              </a:rPr>
+              <a:t>STL</a:t>
+            </a:r>
+          </a:p>
+          <a:p>
+            <a:pPr algn="ctr"/>
+            <a:r>
+              <a:rPr lang="zh-CN" altLang="en-US" b="1" dirty="0" smtClean="0">
+                <a:latin typeface="微软雅黑" panose="020B0503020204020204" pitchFamily="34" charset="-122"/>
+                <a:ea typeface="微软雅黑" panose="020B0503020204020204" pitchFamily="34" charset="-122"/>
+              </a:rPr>
+              <a:t>悖论</a:t>
+            </a:r>
+            <a:endParaRPr lang="zh-CN" altLang="en-US" b="1" dirty="0">
+              <a:latin typeface="微软雅黑" panose="020B0503020204020204" pitchFamily="34" charset="-122"/>
+              <a:ea typeface="微软雅黑" panose="020B0503020204020204" pitchFamily="34" charset="-122"/>
+            </a:endParaRPr>
+          </a:p>
+        </p:txBody>
+      </p:sp>
+      <p:sp>
+        <p:nvSpPr>
+          <p:cNvPr id="14" name="TextBox 27"/>
+          <p:cNvSpPr txBox="1"/>
+          <p:nvPr/>
+        </p:nvSpPr>
+        <p:spPr>
+          <a:xfrm>
+            <a:off x="1907704" y="1442458"/>
+            <a:ext cx="2232496" cy="1061829"/>
+          </a:xfrm>
+          <a:prstGeom prst="rect">
+            <a:avLst/>
+          </a:prstGeom>
+          <a:noFill/>
+        </p:spPr>
+        <p:txBody>
+          <a:bodyPr wrap="square" rtlCol="0">
+            <a:spAutoFit/>
+          </a:bodyPr>
+          <a:lstStyle/>
+          <a:p>
+            <a:pPr lvl="0"/>
+            <a:r>
+              <a:rPr lang="zh-CN" altLang="en-US" sz="1500" b="1" dirty="0" smtClean="0">
+                <a:solidFill>
+                  <a:schemeClr val="tx1">
+                    <a:lumMod val="75000"/>
+                    <a:lumOff val="25000"/>
+                  </a:schemeClr>
+                </a:solidFill>
+                <a:latin typeface="微软雅黑" panose="020B0503020204020204" pitchFamily="34" charset="-122"/>
+                <a:ea typeface="微软雅黑" panose="020B0503020204020204" pitchFamily="34" charset="-122"/>
+              </a:rPr>
+              <a:t>数据集中出现观光车</a:t>
+            </a:r>
+            <a:endParaRPr lang="en-US" altLang="zh-CN" sz="1500" b="1" dirty="0" smtClean="0">
+              <a:solidFill>
+                <a:schemeClr val="tx1">
+                  <a:lumMod val="75000"/>
+                  <a:lumOff val="25000"/>
+                </a:schemeClr>
+              </a:solidFill>
+              <a:latin typeface="微软雅黑" panose="020B0503020204020204" pitchFamily="34" charset="-122"/>
+              <a:ea typeface="微软雅黑" panose="020B0503020204020204" pitchFamily="34" charset="-122"/>
+            </a:endParaRPr>
+          </a:p>
+          <a:p>
+            <a:pPr lvl="0"/>
+            <a:r>
+              <a:rPr lang="en-US" altLang="zh-CN" sz="1200" dirty="0" smtClean="0">
+                <a:solidFill>
+                  <a:schemeClr val="tx1">
+                    <a:lumMod val="75000"/>
+                    <a:lumOff val="25000"/>
+                  </a:schemeClr>
+                </a:solidFill>
+                <a:latin typeface="微软雅黑" panose="020B0503020204020204" pitchFamily="34" charset="-122"/>
+                <a:ea typeface="微软雅黑" panose="020B0503020204020204" pitchFamily="34" charset="-122"/>
+              </a:rPr>
+              <a:t>· </a:t>
+            </a:r>
+            <a:r>
+              <a:rPr lang="zh-CN" altLang="en-US" sz="1200" dirty="0" smtClean="0">
+                <a:solidFill>
+                  <a:schemeClr val="tx1">
+                    <a:lumMod val="75000"/>
+                    <a:lumOff val="25000"/>
+                  </a:schemeClr>
+                </a:solidFill>
+                <a:latin typeface="微软雅黑" panose="020B0503020204020204" pitchFamily="34" charset="-122"/>
+                <a:ea typeface="微软雅黑" panose="020B0503020204020204" pitchFamily="34" charset="-122"/>
+              </a:rPr>
+              <a:t>少量车运行中有相同站</a:t>
+            </a:r>
+            <a:endParaRPr lang="en-US" altLang="zh-CN" sz="1200" dirty="0">
+              <a:solidFill>
+                <a:schemeClr val="tx1">
+                  <a:lumMod val="75000"/>
+                  <a:lumOff val="25000"/>
+                </a:schemeClr>
+              </a:solidFill>
+              <a:latin typeface="微软雅黑" panose="020B0503020204020204" pitchFamily="34" charset="-122"/>
+              <a:ea typeface="微软雅黑" panose="020B0503020204020204" pitchFamily="34" charset="-122"/>
+            </a:endParaRPr>
+          </a:p>
+          <a:p>
+            <a:r>
+              <a:rPr lang="en-US" altLang="zh-CN" sz="1200" dirty="0">
+                <a:solidFill>
+                  <a:schemeClr val="tx1">
+                    <a:lumMod val="75000"/>
+                    <a:lumOff val="25000"/>
+                  </a:schemeClr>
+                </a:solidFill>
+                <a:latin typeface="微软雅黑" panose="020B0503020204020204" pitchFamily="34" charset="-122"/>
+                <a:ea typeface="微软雅黑" panose="020B0503020204020204" pitchFamily="34" charset="-122"/>
+              </a:rPr>
+              <a:t>· </a:t>
+            </a:r>
+            <a:r>
+              <a:rPr lang="zh-CN" altLang="en-US" sz="1200" dirty="0">
+                <a:solidFill>
+                  <a:schemeClr val="tx1">
+                    <a:lumMod val="75000"/>
+                    <a:lumOff val="25000"/>
+                  </a:schemeClr>
+                </a:solidFill>
+                <a:latin typeface="微软雅黑" panose="020B0503020204020204" pitchFamily="34" charset="-122"/>
+                <a:ea typeface="微软雅黑" panose="020B0503020204020204" pitchFamily="34" charset="-122"/>
+              </a:rPr>
+              <a:t>极少量车次运行中只有起点和终点、且起点和终点相同</a:t>
+            </a:r>
+            <a:endParaRPr lang="en-US" altLang="zh-CN" sz="1200" dirty="0">
+              <a:solidFill>
+                <a:schemeClr val="tx1">
+                  <a:lumMod val="75000"/>
+                  <a:lumOff val="25000"/>
+                </a:schemeClr>
+              </a:solidFill>
+              <a:latin typeface="微软雅黑" panose="020B0503020204020204" pitchFamily="34" charset="-122"/>
+              <a:ea typeface="微软雅黑" panose="020B0503020204020204" pitchFamily="34" charset="-122"/>
+            </a:endParaRPr>
+          </a:p>
+          <a:p>
+            <a:pPr lvl="0"/>
+            <a:endParaRPr lang="zh-CN" altLang="en-US" sz="1200" b="1" dirty="0">
+              <a:solidFill>
+                <a:schemeClr val="tx1">
+                  <a:lumMod val="75000"/>
+                  <a:lumOff val="25000"/>
+                </a:schemeClr>
+              </a:solidFill>
+              <a:latin typeface="微软雅黑" panose="020B0503020204020204" pitchFamily="34" charset="-122"/>
+              <a:ea typeface="微软雅黑" panose="020B0503020204020204" pitchFamily="34" charset="-122"/>
+            </a:endParaRPr>
+          </a:p>
+        </p:txBody>
+      </p:sp>
+      <p:sp>
+        <p:nvSpPr>
+          <p:cNvPr id="15" name="TextBox 12"/>
+          <p:cNvSpPr txBox="1"/>
+          <p:nvPr/>
+        </p:nvSpPr>
+        <p:spPr>
+          <a:xfrm>
+            <a:off x="336309" y="3352249"/>
+            <a:ext cx="2232496" cy="692497"/>
+          </a:xfrm>
+          <a:prstGeom prst="rect">
+            <a:avLst/>
+          </a:prstGeom>
+          <a:noFill/>
+        </p:spPr>
+        <p:txBody>
+          <a:bodyPr wrap="square" rtlCol="0">
+            <a:spAutoFit/>
+          </a:bodyPr>
+          <a:lstStyle/>
+          <a:p>
+            <a:pPr lvl="0" algn="r"/>
+            <a:r>
+              <a:rPr lang="zh-CN" altLang="en-US" sz="1500" b="1" dirty="0" smtClean="0">
+                <a:solidFill>
+                  <a:schemeClr val="tx1">
+                    <a:lumMod val="75000"/>
+                    <a:lumOff val="25000"/>
+                  </a:schemeClr>
+                </a:solidFill>
+                <a:latin typeface="微软雅黑" panose="020B0503020204020204" pitchFamily="34" charset="-122"/>
+                <a:ea typeface="微软雅黑" panose="020B0503020204020204" pitchFamily="34" charset="-122"/>
+              </a:rPr>
+              <a:t>文件读入时字符编码</a:t>
+            </a:r>
+            <a:endParaRPr lang="en-US" altLang="zh-CN" sz="1500" b="1" dirty="0" smtClean="0">
+              <a:solidFill>
+                <a:schemeClr val="tx1">
+                  <a:lumMod val="75000"/>
+                  <a:lumOff val="25000"/>
+                </a:schemeClr>
+              </a:solidFill>
+              <a:latin typeface="微软雅黑" panose="020B0503020204020204" pitchFamily="34" charset="-122"/>
+              <a:ea typeface="微软雅黑" panose="020B0503020204020204" pitchFamily="34" charset="-122"/>
+            </a:endParaRPr>
+          </a:p>
+          <a:p>
+            <a:pPr lvl="0" algn="r"/>
+            <a:r>
+              <a:rPr lang="en-US" altLang="zh-CN" sz="1200" dirty="0" smtClean="0">
+                <a:solidFill>
+                  <a:schemeClr val="tx1">
+                    <a:lumMod val="75000"/>
+                    <a:lumOff val="25000"/>
+                  </a:schemeClr>
+                </a:solidFill>
+                <a:latin typeface="微软雅黑" panose="020B0503020204020204" pitchFamily="34" charset="-122"/>
+                <a:ea typeface="微软雅黑" panose="020B0503020204020204" pitchFamily="34" charset="-122"/>
+              </a:rPr>
+              <a:t>· </a:t>
+            </a:r>
+            <a:r>
+              <a:rPr lang="zh-CN" altLang="en-US" sz="1200" dirty="0" smtClean="0">
+                <a:solidFill>
+                  <a:schemeClr val="tx1">
+                    <a:lumMod val="75000"/>
+                    <a:lumOff val="25000"/>
+                  </a:schemeClr>
+                </a:solidFill>
+                <a:latin typeface="微软雅黑" panose="020B0503020204020204" pitchFamily="34" charset="-122"/>
+                <a:ea typeface="微软雅黑" panose="020B0503020204020204" pitchFamily="34" charset="-122"/>
+              </a:rPr>
+              <a:t>由于不同系统的中文编码问题出现乱码情况</a:t>
+            </a:r>
+            <a:endParaRPr lang="zh-CN" altLang="en-US" sz="1200" dirty="0">
+              <a:solidFill>
+                <a:schemeClr val="tx1">
+                  <a:lumMod val="75000"/>
+                  <a:lumOff val="25000"/>
+                </a:schemeClr>
+              </a:solidFill>
+              <a:latin typeface="微软雅黑" panose="020B0503020204020204" pitchFamily="34" charset="-122"/>
+              <a:ea typeface="微软雅黑" panose="020B0503020204020204" pitchFamily="34" charset="-122"/>
+            </a:endParaRPr>
+          </a:p>
+        </p:txBody>
+      </p:sp>
+      <p:sp>
+        <p:nvSpPr>
+          <p:cNvPr id="16" name="TextBox 29"/>
+          <p:cNvSpPr txBox="1"/>
+          <p:nvPr/>
+        </p:nvSpPr>
+        <p:spPr>
+          <a:xfrm>
+            <a:off x="6372200" y="1427800"/>
+            <a:ext cx="2232496" cy="877163"/>
+          </a:xfrm>
+          <a:prstGeom prst="rect">
+            <a:avLst/>
+          </a:prstGeom>
+          <a:noFill/>
+        </p:spPr>
+        <p:txBody>
+          <a:bodyPr wrap="square" rtlCol="0">
+            <a:spAutoFit/>
+          </a:bodyPr>
+          <a:lstStyle/>
+          <a:p>
+            <a:pPr lvl="0"/>
+            <a:r>
+              <a:rPr lang="zh-CN" altLang="en-US" sz="1500" b="1" dirty="0" smtClean="0">
+                <a:solidFill>
+                  <a:schemeClr val="tx1">
+                    <a:lumMod val="75000"/>
+                    <a:lumOff val="25000"/>
+                  </a:schemeClr>
+                </a:solidFill>
+                <a:latin typeface="微软雅黑" panose="020B0503020204020204" pitchFamily="34" charset="-122"/>
+                <a:ea typeface="微软雅黑" panose="020B0503020204020204" pitchFamily="34" charset="-122"/>
+              </a:rPr>
+              <a:t>网络连线零基础</a:t>
+            </a:r>
+            <a:endParaRPr lang="en-US" altLang="zh-CN" sz="1500" b="1" dirty="0" smtClean="0">
+              <a:solidFill>
+                <a:schemeClr val="tx1">
+                  <a:lumMod val="75000"/>
+                  <a:lumOff val="25000"/>
+                </a:schemeClr>
+              </a:solidFill>
+              <a:latin typeface="微软雅黑" panose="020B0503020204020204" pitchFamily="34" charset="-122"/>
+              <a:ea typeface="微软雅黑" panose="020B0503020204020204" pitchFamily="34" charset="-122"/>
+            </a:endParaRPr>
+          </a:p>
+          <a:p>
+            <a:pPr lvl="0"/>
+            <a:r>
+              <a:rPr lang="en-US" altLang="zh-CN" sz="1200" dirty="0" smtClean="0">
+                <a:solidFill>
+                  <a:schemeClr val="tx1">
+                    <a:lumMod val="75000"/>
+                    <a:lumOff val="25000"/>
+                  </a:schemeClr>
+                </a:solidFill>
+                <a:latin typeface="微软雅黑" panose="020B0503020204020204" pitchFamily="34" charset="-122"/>
+                <a:ea typeface="微软雅黑" panose="020B0503020204020204" pitchFamily="34" charset="-122"/>
+              </a:rPr>
+              <a:t>· </a:t>
+            </a:r>
+            <a:r>
+              <a:rPr lang="zh-CN" altLang="en-US" sz="1200" dirty="0" smtClean="0">
+                <a:solidFill>
+                  <a:schemeClr val="tx1">
+                    <a:lumMod val="75000"/>
+                    <a:lumOff val="25000"/>
+                  </a:schemeClr>
+                </a:solidFill>
+                <a:latin typeface="微软雅黑" panose="020B0503020204020204" pitchFamily="34" charset="-122"/>
+                <a:ea typeface="微软雅黑" panose="020B0503020204020204" pitchFamily="34" charset="-122"/>
+              </a:rPr>
+              <a:t>由于对网络的连线缺乏经验，这一部分的操作都需要从零开始</a:t>
+            </a:r>
+            <a:endParaRPr lang="en-US" altLang="zh-CN" sz="1200" dirty="0" smtClean="0">
+              <a:solidFill>
+                <a:schemeClr val="tx1">
+                  <a:lumMod val="75000"/>
+                  <a:lumOff val="25000"/>
+                </a:schemeClr>
+              </a:solidFill>
+              <a:latin typeface="微软雅黑" panose="020B0503020204020204" pitchFamily="34" charset="-122"/>
+              <a:ea typeface="微软雅黑" panose="020B0503020204020204" pitchFamily="34" charset="-122"/>
+            </a:endParaRPr>
+          </a:p>
+        </p:txBody>
+      </p:sp>
+      <p:sp>
+        <p:nvSpPr>
+          <p:cNvPr id="17" name="TextBox 30"/>
+          <p:cNvSpPr txBox="1"/>
+          <p:nvPr/>
+        </p:nvSpPr>
+        <p:spPr>
+          <a:xfrm>
+            <a:off x="4669818" y="3356525"/>
+            <a:ext cx="2232496" cy="692497"/>
+          </a:xfrm>
+          <a:prstGeom prst="rect">
+            <a:avLst/>
+          </a:prstGeom>
+          <a:noFill/>
+        </p:spPr>
+        <p:txBody>
+          <a:bodyPr wrap="square" rtlCol="0">
+            <a:spAutoFit/>
+          </a:bodyPr>
+          <a:lstStyle/>
+          <a:p>
+            <a:pPr lvl="0" algn="r"/>
+            <a:r>
+              <a:rPr lang="en-US" altLang="zh-CN" sz="1500" b="1" dirty="0" smtClean="0">
+                <a:solidFill>
+                  <a:schemeClr val="tx1">
+                    <a:lumMod val="75000"/>
+                    <a:lumOff val="25000"/>
+                  </a:schemeClr>
+                </a:solidFill>
+                <a:latin typeface="微软雅黑" panose="020B0503020204020204" pitchFamily="34" charset="-122"/>
+                <a:ea typeface="微软雅黑" panose="020B0503020204020204" pitchFamily="34" charset="-122"/>
+              </a:rPr>
+              <a:t>STL</a:t>
+            </a:r>
+            <a:r>
+              <a:rPr lang="zh-CN" altLang="en-US" sz="1500" b="1" dirty="0">
+                <a:solidFill>
+                  <a:schemeClr val="tx1">
+                    <a:lumMod val="75000"/>
+                    <a:lumOff val="25000"/>
+                  </a:schemeClr>
+                </a:solidFill>
+                <a:latin typeface="微软雅黑" panose="020B0503020204020204" pitchFamily="34" charset="-122"/>
+                <a:ea typeface="微软雅黑" panose="020B0503020204020204" pitchFamily="34" charset="-122"/>
+              </a:rPr>
+              <a:t>、</a:t>
+            </a:r>
+            <a:r>
+              <a:rPr lang="zh-CN" altLang="en-US" sz="1500" b="1" dirty="0" smtClean="0">
+                <a:solidFill>
+                  <a:schemeClr val="tx1">
+                    <a:lumMod val="75000"/>
+                    <a:lumOff val="25000"/>
+                  </a:schemeClr>
+                </a:solidFill>
+                <a:latin typeface="微软雅黑" panose="020B0503020204020204" pitchFamily="34" charset="-122"/>
+                <a:ea typeface="微软雅黑" panose="020B0503020204020204" pitchFamily="34" charset="-122"/>
+              </a:rPr>
+              <a:t>火车票</a:t>
+            </a:r>
+            <a:r>
+              <a:rPr lang="en-US" altLang="zh-CN" sz="1500" b="1" dirty="0" smtClean="0">
+                <a:solidFill>
+                  <a:schemeClr val="tx1">
+                    <a:lumMod val="75000"/>
+                    <a:lumOff val="25000"/>
+                  </a:schemeClr>
+                </a:solidFill>
+                <a:latin typeface="微软雅黑" panose="020B0503020204020204" pitchFamily="34" charset="-122"/>
+                <a:ea typeface="微软雅黑" panose="020B0503020204020204" pitchFamily="34" charset="-122"/>
+              </a:rPr>
+              <a:t>or</a:t>
+            </a:r>
+            <a:r>
+              <a:rPr lang="zh-CN" altLang="en-US" sz="1500" b="1" dirty="0" smtClean="0">
+                <a:solidFill>
+                  <a:schemeClr val="tx1">
+                    <a:lumMod val="75000"/>
+                    <a:lumOff val="25000"/>
+                  </a:schemeClr>
+                </a:solidFill>
+                <a:latin typeface="微软雅黑" panose="020B0503020204020204" pitchFamily="34" charset="-122"/>
+                <a:ea typeface="微软雅黑" panose="020B0503020204020204" pitchFamily="34" charset="-122"/>
+              </a:rPr>
+              <a:t>期中考</a:t>
+            </a:r>
+            <a:endParaRPr lang="en-US" altLang="zh-CN" sz="1500" b="1" dirty="0" smtClean="0">
+              <a:solidFill>
+                <a:schemeClr val="tx1">
+                  <a:lumMod val="75000"/>
+                  <a:lumOff val="25000"/>
+                </a:schemeClr>
+              </a:solidFill>
+              <a:latin typeface="微软雅黑" panose="020B0503020204020204" pitchFamily="34" charset="-122"/>
+              <a:ea typeface="微软雅黑" panose="020B0503020204020204" pitchFamily="34" charset="-122"/>
+            </a:endParaRPr>
+          </a:p>
+          <a:p>
+            <a:pPr lvl="0" algn="r"/>
+            <a:r>
+              <a:rPr lang="en-US" altLang="zh-CN" sz="1200" dirty="0" smtClean="0">
+                <a:solidFill>
+                  <a:schemeClr val="tx1">
+                    <a:lumMod val="75000"/>
+                    <a:lumOff val="25000"/>
+                  </a:schemeClr>
+                </a:solidFill>
+                <a:latin typeface="微软雅黑" panose="020B0503020204020204" pitchFamily="34" charset="-122"/>
+                <a:ea typeface="微软雅黑" panose="020B0503020204020204" pitchFamily="34" charset="-122"/>
+              </a:rPr>
+              <a:t>· </a:t>
+            </a:r>
+            <a:r>
+              <a:rPr lang="zh-CN" altLang="en-US" sz="1200" dirty="0" smtClean="0">
+                <a:solidFill>
+                  <a:schemeClr val="tx1">
+                    <a:lumMod val="75000"/>
+                    <a:lumOff val="25000"/>
+                  </a:schemeClr>
+                </a:solidFill>
+                <a:latin typeface="微软雅黑" panose="020B0503020204020204" pitchFamily="34" charset="-122"/>
+                <a:ea typeface="微软雅黑" panose="020B0503020204020204" pitchFamily="34" charset="-122"/>
+              </a:rPr>
+              <a:t>三者交错进行，引发工期延误，造成火车难产</a:t>
+            </a:r>
+            <a:endParaRPr lang="zh-CN" altLang="en-US" sz="1200" dirty="0">
+              <a:solidFill>
+                <a:schemeClr val="tx1">
+                  <a:lumMod val="75000"/>
+                  <a:lumOff val="25000"/>
+                </a:schemeClr>
+              </a:solidFill>
+              <a:latin typeface="微软雅黑" panose="020B0503020204020204" pitchFamily="34" charset="-122"/>
+              <a:ea typeface="微软雅黑" panose="020B0503020204020204" pitchFamily="34" charset="-122"/>
+            </a:endParaRPr>
+          </a:p>
+        </p:txBody>
+      </p:sp>
+    </p:spTree>
+    <p:extLst>
+      <p:ext uri="{BB962C8B-B14F-4D97-AF65-F5344CB8AC3E}">
+        <p14:creationId xmlns:p14="http://schemas.microsoft.com/office/powerpoint/2010/main" val="2499359008"/>
+      </p:ext>
+    </p:extLst>
+  </p:cSld>
+  <p:clrMapOvr>
+    <a:masterClrMapping/>
+  </p:clrMapOvr>
+</p:sld>
+</file>
+
+<file path=ppt/slides/slide13.xml><?xml version="1.0" encoding="utf-8"?>
 <p:sld xmlns:a="http://schemas.openxmlformats.org/drawingml/2006/main" xmlns:r="http://schemas.openxmlformats.org/officeDocument/2006/relationships" xmlns:p="http://schemas.openxmlformats.org/presentationml/2006/main">
   <p:cSld>
     <p:spTree>
@@ -7458,7 +8604,7 @@
 </p:sld>
 </file>
 
-<file path=ppt/slides/slide13.xml><?xml version="1.0" encoding="utf-8"?>
+<file path=ppt/slides/slide14.xml><?xml version="1.0" encoding="utf-8"?>
 <p:sld xmlns:a="http://schemas.openxmlformats.org/drawingml/2006/main" xmlns:r="http://schemas.openxmlformats.org/officeDocument/2006/relationships" xmlns:p="http://schemas.openxmlformats.org/presentationml/2006/main">
   <p:cSld>
     <p:spTree>
@@ -7846,7 +8992,7 @@
 </p:sld>
 </file>
 
-<file path=ppt/slides/slide14.xml><?xml version="1.0" encoding="utf-8"?>
+<file path=ppt/slides/slide15.xml><?xml version="1.0" encoding="utf-8"?>
 <p:sld xmlns:a="http://schemas.openxmlformats.org/drawingml/2006/main" xmlns:r="http://schemas.openxmlformats.org/officeDocument/2006/relationships" xmlns:p="http://schemas.openxmlformats.org/presentationml/2006/main">
   <p:cSld>
     <p:spTree>
@@ -8940,7 +10086,7 @@
 </p:sld>
 </file>
 
-<file path=ppt/slides/slide15.xml><?xml version="1.0" encoding="utf-8"?>
+<file path=ppt/slides/slide16.xml><?xml version="1.0" encoding="utf-8"?>
 <p:sld xmlns:a="http://schemas.openxmlformats.org/drawingml/2006/main" xmlns:r="http://schemas.openxmlformats.org/officeDocument/2006/relationships" xmlns:p="http://schemas.openxmlformats.org/presentationml/2006/main">
   <p:cSld>
     <p:spTree>
@@ -9834,7 +10980,7 @@
 </p:sld>
 </file>
 
-<file path=ppt/slides/slide16.xml><?xml version="1.0" encoding="utf-8"?>
+<file path=ppt/slides/slide17.xml><?xml version="1.0" encoding="utf-8"?>
 <p:sld xmlns:a="http://schemas.openxmlformats.org/drawingml/2006/main" xmlns:r="http://schemas.openxmlformats.org/officeDocument/2006/relationships" xmlns:p="http://schemas.openxmlformats.org/presentationml/2006/main">
   <p:cSld>
     <p:spTree>
@@ -10163,7 +11309,7 @@
 </p:sld>
 </file>
 
-<file path=ppt/slides/slide17.xml><?xml version="1.0" encoding="utf-8"?>
+<file path=ppt/slides/slide18.xml><?xml version="1.0" encoding="utf-8"?>
 <p:sld xmlns:a="http://schemas.openxmlformats.org/drawingml/2006/main" xmlns:r="http://schemas.openxmlformats.org/officeDocument/2006/relationships" xmlns:p="http://schemas.openxmlformats.org/presentationml/2006/main">
   <p:cSld>
     <p:spTree>
@@ -16648,20 +17794,7 @@
                 <a:latin typeface="微软雅黑" panose="020B0503020204020204" pitchFamily="34" charset="-122"/>
                 <a:ea typeface="微软雅黑" panose="020B0503020204020204" pitchFamily="34" charset="-122"/>
               </a:rPr>
-              <a:t>管理员</a:t>
-            </a:r>
-            <a:r>
-              <a:rPr lang="zh-CN" altLang="en-US" sz="1600" b="1" dirty="0" smtClean="0">
-                <a:solidFill>
-                  <a:schemeClr val="tx1">
-                    <a:lumMod val="75000"/>
-                    <a:lumOff val="25000"/>
-                  </a:schemeClr>
-                </a:solidFill>
-                <a:latin typeface="微软雅黑" panose="020B0503020204020204" pitchFamily="34" charset="-122"/>
-                <a:ea typeface="微软雅黑" panose="020B0503020204020204" pitchFamily="34" charset="-122"/>
-              </a:rPr>
-              <a:t>登录</a:t>
+              <a:t>管理员登录</a:t>
             </a:r>
             <a:endParaRPr lang="en-US" altLang="zh-CN" sz="1600" b="1" dirty="0">
               <a:solidFill>
@@ -16722,20 +17855,7 @@
                 <a:latin typeface="微软雅黑" panose="020B0503020204020204" pitchFamily="34" charset="-122"/>
                 <a:ea typeface="微软雅黑" panose="020B0503020204020204" pitchFamily="34" charset="-122"/>
               </a:rPr>
-              <a:t>查询</a:t>
-            </a:r>
-            <a:r>
-              <a:rPr lang="zh-CN" altLang="en-US" sz="1600" b="1" dirty="0" smtClean="0">
-                <a:solidFill>
-                  <a:schemeClr val="tx1">
-                    <a:lumMod val="75000"/>
-                    <a:lumOff val="25000"/>
-                  </a:schemeClr>
-                </a:solidFill>
-                <a:latin typeface="微软雅黑" panose="020B0503020204020204" pitchFamily="34" charset="-122"/>
-                <a:ea typeface="微软雅黑" panose="020B0503020204020204" pitchFamily="34" charset="-122"/>
-              </a:rPr>
-              <a:t>修改用户</a:t>
+              <a:t>查询修改用户</a:t>
             </a:r>
             <a:endParaRPr lang="en-US" altLang="zh-CN" sz="1600" b="1" dirty="0">
               <a:solidFill>
@@ -16796,20 +17916,7 @@
                 <a:latin typeface="微软雅黑" panose="020B0503020204020204" pitchFamily="34" charset="-122"/>
                 <a:ea typeface="微软雅黑" panose="020B0503020204020204" pitchFamily="34" charset="-122"/>
               </a:rPr>
-              <a:t>增删</a:t>
-            </a:r>
-            <a:r>
-              <a:rPr lang="zh-CN" altLang="en-US" sz="1600" b="1" dirty="0" smtClean="0">
-                <a:solidFill>
-                  <a:schemeClr val="tx1">
-                    <a:lumMod val="75000"/>
-                    <a:lumOff val="25000"/>
-                  </a:schemeClr>
-                </a:solidFill>
-                <a:latin typeface="微软雅黑" panose="020B0503020204020204" pitchFamily="34" charset="-122"/>
-                <a:ea typeface="微软雅黑" panose="020B0503020204020204" pitchFamily="34" charset="-122"/>
-              </a:rPr>
-              <a:t>改运行计划</a:t>
+              <a:t>增删改运行计划</a:t>
             </a:r>
             <a:endParaRPr lang="en-US" altLang="zh-CN" sz="1600" b="1" dirty="0">
               <a:solidFill>
@@ -17282,16 +18389,6 @@
               </a:rPr>
               <a:t>主菜单</a:t>
             </a:r>
-            <a:endParaRPr lang="zh-CN" altLang="en-US" b="1" dirty="0">
-              <a:solidFill>
-                <a:schemeClr val="tx1">
-                  <a:lumMod val="75000"/>
-                  <a:lumOff val="25000"/>
-                </a:schemeClr>
-              </a:solidFill>
-              <a:latin typeface="微软雅黑" panose="020B0503020204020204" pitchFamily="34" charset="-122"/>
-              <a:ea typeface="微软雅黑" panose="020B0503020204020204" pitchFamily="34" charset="-122"/>
-            </a:endParaRPr>
           </a:p>
         </p:txBody>
       </p:sp>
@@ -18542,36 +19639,6 @@
           <a:xfrm>
             <a:off x="359262" y="858084"/>
             <a:ext cx="4724589" cy="2812489"/>
-          </a:xfrm>
-          <a:prstGeom prst="rect">
-            <a:avLst/>
-          </a:prstGeom>
-        </p:spPr>
-      </p:pic>
-      <p:pic>
-        <p:nvPicPr>
-          <p:cNvPr id="11" name="图片 10"/>
-          <p:cNvPicPr>
-            <a:picLocks noChangeAspect="1"/>
-          </p:cNvPicPr>
-          <p:nvPr/>
-        </p:nvPicPr>
-        <p:blipFill>
-          <a:blip r:embed="rId3" cstate="print">
-            <a:extLst>
-              <a:ext uri="{28A0092B-C50C-407E-A947-70E740481C1C}">
-                <a14:useLocalDpi xmlns:a14="http://schemas.microsoft.com/office/drawing/2010/main" val="0"/>
-              </a:ext>
-            </a:extLst>
-          </a:blip>
-          <a:stretch>
-            <a:fillRect/>
-          </a:stretch>
-        </p:blipFill>
-        <p:spPr>
-          <a:xfrm>
-            <a:off x="4344390" y="2139702"/>
-            <a:ext cx="4523637" cy="2697207"/>
           </a:xfrm>
           <a:prstGeom prst="rect">
             <a:avLst/>

</xml_diff>

<commit_message>
Add user manual and edit it
</commit_message>
<xml_diff>
--- a/Presentation/presentation.pptx
+++ b/Presentation/presentation.pptx
@@ -562,11 +562,7 @@
           <a:p>
             <a:r>
               <a:rPr lang="zh-CN" altLang="en-US" dirty="0" smtClean="0"/>
-              <a:t>左边一列为用户，右边一列是</a:t>
-            </a:r>
-            <a:r>
-              <a:rPr lang="zh-CN" altLang="en-US" dirty="0" smtClean="0"/>
-              <a:t>管理员，右侧的一列是管理员的功能，由于工期的限制，我们在</a:t>
+              <a:t>左边一列为用户，右边一列是管理员，右侧的一列是管理员的功能，由于工期的限制，我们在</a:t>
             </a:r>
             <a:r>
               <a:rPr lang="en-US" altLang="zh-CN" dirty="0" err="1" smtClean="0"/>
@@ -5239,20 +5235,7 @@
                 <a:latin typeface="微软雅黑" panose="020B0503020204020204" pitchFamily="34" charset="-122"/>
                 <a:ea typeface="微软雅黑" panose="020B0503020204020204" pitchFamily="34" charset="-122"/>
               </a:rPr>
-              <a:t>窗口</a:t>
-            </a:r>
-            <a:r>
-              <a:rPr lang="zh-CN" altLang="en-US" sz="1200" b="1" dirty="0" smtClean="0">
-                <a:solidFill>
-                  <a:schemeClr val="tx1">
-                    <a:lumMod val="75000"/>
-                    <a:lumOff val="25000"/>
-                  </a:schemeClr>
-                </a:solidFill>
-                <a:latin typeface="微软雅黑" panose="020B0503020204020204" pitchFamily="34" charset="-122"/>
-                <a:ea typeface="微软雅黑" panose="020B0503020204020204" pitchFamily="34" charset="-122"/>
-              </a:rPr>
-              <a:t>拖拽大小不影响组件相对位置</a:t>
+              <a:t>窗口拖拽大小不影响组件相对位置</a:t>
             </a:r>
             <a:endParaRPr lang="en-US" altLang="zh-CN" sz="1200" b="1" dirty="0" smtClean="0">
               <a:solidFill>
@@ -8212,16 +8195,6 @@
               </a:rPr>
               <a:t>实现映射</a:t>
             </a:r>
-            <a:endParaRPr lang="zh-CN" altLang="en-US" b="1" dirty="0">
-              <a:solidFill>
-                <a:schemeClr val="tx1">
-                  <a:lumMod val="75000"/>
-                  <a:lumOff val="25000"/>
-                </a:schemeClr>
-              </a:solidFill>
-              <a:latin typeface="微软雅黑" panose="020B0503020204020204" pitchFamily="34" charset="-122"/>
-              <a:ea typeface="微软雅黑" panose="020B0503020204020204" pitchFamily="34" charset="-122"/>
-            </a:endParaRPr>
           </a:p>
         </p:txBody>
       </p:sp>
@@ -11728,16 +11701,6 @@
               </a:rPr>
               <a:t>陈竞潇</a:t>
             </a:r>
-            <a:endParaRPr lang="zh-CN" altLang="en-US" b="1" dirty="0">
-              <a:solidFill>
-                <a:schemeClr val="tx1">
-                  <a:lumMod val="75000"/>
-                  <a:lumOff val="25000"/>
-                </a:schemeClr>
-              </a:solidFill>
-              <a:latin typeface="微软雅黑" panose="020B0503020204020204" pitchFamily="34" charset="-122"/>
-              <a:ea typeface="微软雅黑" panose="020B0503020204020204" pitchFamily="34" charset="-122"/>
-            </a:endParaRPr>
           </a:p>
         </p:txBody>
       </p:sp>
@@ -12980,16 +12943,6 @@
               </a:rPr>
               <a:t>吴章昊</a:t>
             </a:r>
-            <a:endParaRPr lang="zh-CN" altLang="en-US" b="1" dirty="0">
-              <a:solidFill>
-                <a:schemeClr val="tx1">
-                  <a:lumMod val="75000"/>
-                  <a:lumOff val="25000"/>
-                </a:schemeClr>
-              </a:solidFill>
-              <a:latin typeface="微软雅黑" panose="020B0503020204020204" pitchFamily="34" charset="-122"/>
-              <a:ea typeface="微软雅黑" panose="020B0503020204020204" pitchFamily="34" charset="-122"/>
-            </a:endParaRPr>
           </a:p>
         </p:txBody>
       </p:sp>
@@ -13123,20 +13076,7 @@
                 <a:latin typeface="微软雅黑" panose="020B0503020204020204" pitchFamily="34" charset="-122"/>
                 <a:ea typeface="微软雅黑" panose="020B0503020204020204" pitchFamily="34" charset="-122"/>
               </a:rPr>
-              <a:t>服务器所需结构体的</a:t>
-            </a:r>
-            <a:r>
-              <a:rPr lang="zh-CN" altLang="en-US" sz="1600" b="1" dirty="0" smtClean="0">
-                <a:solidFill>
-                  <a:schemeClr val="tx1">
-                    <a:lumMod val="75000"/>
-                    <a:lumOff val="25000"/>
-                  </a:schemeClr>
-                </a:solidFill>
-                <a:latin typeface="微软雅黑" panose="020B0503020204020204" pitchFamily="34" charset="-122"/>
-                <a:ea typeface="微软雅黑" panose="020B0503020204020204" pitchFamily="34" charset="-122"/>
-              </a:rPr>
-              <a:t>设计</a:t>
+              <a:t>服务器所需结构体的设计</a:t>
             </a:r>
             <a:endParaRPr lang="en-US" altLang="zh-CN" sz="1600" b="1" dirty="0" smtClean="0">
               <a:solidFill>
@@ -13168,20 +13108,7 @@
                 <a:latin typeface="微软雅黑" panose="020B0503020204020204" pitchFamily="34" charset="-122"/>
                 <a:ea typeface="微软雅黑" panose="020B0503020204020204" pitchFamily="34" charset="-122"/>
               </a:rPr>
-              <a:t>智能</a:t>
-            </a:r>
-            <a:r>
-              <a:rPr lang="zh-CN" altLang="en-US" sz="1600" b="1" dirty="0" smtClean="0">
-                <a:solidFill>
-                  <a:schemeClr val="tx1">
-                    <a:lumMod val="75000"/>
-                    <a:lumOff val="25000"/>
-                  </a:schemeClr>
-                </a:solidFill>
-                <a:latin typeface="微软雅黑" panose="020B0503020204020204" pitchFamily="34" charset="-122"/>
-                <a:ea typeface="微软雅黑" panose="020B0503020204020204" pitchFamily="34" charset="-122"/>
-              </a:rPr>
-              <a:t>指针类实现</a:t>
+              <a:t>智能指针类实现</a:t>
             </a:r>
             <a:endParaRPr lang="en-US" altLang="zh-CN" sz="1600" b="1" dirty="0" smtClean="0">
               <a:solidFill>
@@ -14303,16 +14230,6 @@
               </a:rPr>
               <a:t>沈柯达</a:t>
             </a:r>
-            <a:endParaRPr lang="zh-CN" altLang="en-US" b="1" dirty="0">
-              <a:solidFill>
-                <a:schemeClr val="tx1">
-                  <a:lumMod val="75000"/>
-                  <a:lumOff val="25000"/>
-                </a:schemeClr>
-              </a:solidFill>
-              <a:latin typeface="微软雅黑" panose="020B0503020204020204" pitchFamily="34" charset="-122"/>
-              <a:ea typeface="微软雅黑" panose="020B0503020204020204" pitchFamily="34" charset="-122"/>
-            </a:endParaRPr>
           </a:p>
         </p:txBody>
       </p:sp>
@@ -14325,7 +14242,7 @@
         <p:spPr>
           <a:xfrm>
             <a:off x="2195736" y="2116729"/>
-            <a:ext cx="6048672" cy="1938992"/>
+            <a:ext cx="6048672" cy="2308324"/>
           </a:xfrm>
           <a:prstGeom prst="rect">
             <a:avLst/>
@@ -14356,20 +14273,7 @@
                 <a:latin typeface="微软雅黑" panose="020B0503020204020204" pitchFamily="34" charset="-122"/>
                 <a:ea typeface="微软雅黑" panose="020B0503020204020204" pitchFamily="34" charset="-122"/>
               </a:rPr>
-              <a:t>后端类的</a:t>
-            </a:r>
-            <a:r>
-              <a:rPr lang="zh-CN" altLang="en-US" sz="1600" b="1" dirty="0" smtClean="0">
-                <a:solidFill>
-                  <a:schemeClr val="tx1">
-                    <a:lumMod val="75000"/>
-                    <a:lumOff val="25000"/>
-                  </a:schemeClr>
-                </a:solidFill>
-                <a:latin typeface="微软雅黑" panose="020B0503020204020204" pitchFamily="34" charset="-122"/>
-                <a:ea typeface="微软雅黑" panose="020B0503020204020204" pitchFamily="34" charset="-122"/>
-              </a:rPr>
-              <a:t>实现</a:t>
+              <a:t>后端类的实现</a:t>
             </a:r>
             <a:endParaRPr lang="en-US" altLang="zh-CN" sz="1600" b="1" dirty="0" smtClean="0">
               <a:solidFill>
@@ -14399,20 +14303,7 @@
                 <a:latin typeface="微软雅黑" panose="020B0503020204020204" pitchFamily="34" charset="-122"/>
                 <a:ea typeface="微软雅黑" panose="020B0503020204020204" pitchFamily="34" charset="-122"/>
               </a:rPr>
-              <a:t>（</a:t>
-            </a:r>
-            <a:r>
-              <a:rPr lang="zh-CN" altLang="en-US" sz="1600" b="1" dirty="0" smtClean="0">
-                <a:solidFill>
-                  <a:schemeClr val="tx1">
-                    <a:lumMod val="75000"/>
-                    <a:lumOff val="25000"/>
-                  </a:schemeClr>
-                </a:solidFill>
-                <a:latin typeface="微软雅黑" panose="020B0503020204020204" pitchFamily="34" charset="-122"/>
-                <a:ea typeface="微软雅黑" panose="020B0503020204020204" pitchFamily="34" charset="-122"/>
-              </a:rPr>
-              <a:t>包括</a:t>
+              <a:t>（包括</a:t>
             </a:r>
             <a:r>
               <a:rPr lang="en-US" altLang="zh-CN" sz="1600" b="1" dirty="0" smtClean="0">
@@ -14483,7 +14374,52 @@
                 <a:latin typeface="微软雅黑" panose="020B0503020204020204" pitchFamily="34" charset="-122"/>
                 <a:ea typeface="微软雅黑" panose="020B0503020204020204" pitchFamily="34" charset="-122"/>
               </a:rPr>
-              <a:t>后端初步调试</a:t>
+              <a:t>后端大部分工作</a:t>
+            </a:r>
+            <a:endParaRPr lang="en-US" altLang="zh-CN" sz="1600" b="1" dirty="0" smtClean="0">
+              <a:solidFill>
+                <a:schemeClr val="tx1">
+                  <a:lumMod val="75000"/>
+                  <a:lumOff val="25000"/>
+                </a:schemeClr>
+              </a:solidFill>
+              <a:latin typeface="微软雅黑" panose="020B0503020204020204" pitchFamily="34" charset="-122"/>
+              <a:ea typeface="微软雅黑" panose="020B0503020204020204" pitchFamily="34" charset="-122"/>
+            </a:endParaRPr>
+          </a:p>
+          <a:p>
+            <a:pPr marL="285750" lvl="0" indent="-285750">
+              <a:lnSpc>
+                <a:spcPct val="150000"/>
+              </a:lnSpc>
+              <a:buFont typeface="Wingdings" panose="05000000000000000000" pitchFamily="2" charset="2"/>
+              <a:buChar char="Ø"/>
+            </a:pPr>
+            <a:r>
+              <a:rPr lang="zh-CN" altLang="en-US" sz="1600" b="1" dirty="0" smtClean="0">
+                <a:solidFill>
+                  <a:schemeClr val="tx1">
+                    <a:lumMod val="75000"/>
+                    <a:lumOff val="25000"/>
+                  </a:schemeClr>
+                </a:solidFill>
+                <a:latin typeface="微软雅黑" panose="020B0503020204020204" pitchFamily="34" charset="-122"/>
+                <a:ea typeface="微软雅黑" panose="020B0503020204020204" pitchFamily="34" charset="-122"/>
+              </a:rPr>
+              <a:t>后端</a:t>
+            </a:r>
+            <a:r>
+              <a:rPr lang="zh-CN" altLang="en-US" sz="1600" b="1" dirty="0" smtClean="0">
+                <a:solidFill>
+                  <a:schemeClr val="tx1">
+                    <a:lumMod val="75000"/>
+                    <a:lumOff val="25000"/>
+                  </a:schemeClr>
+                </a:solidFill>
+                <a:latin typeface="微软雅黑" panose="020B0503020204020204" pitchFamily="34" charset="-122"/>
+                <a:ea typeface="微软雅黑" panose="020B0503020204020204" pitchFamily="34" charset="-122"/>
+              </a:rPr>
+              <a:t>初步调试</a:t>
             </a:r>
             <a:endParaRPr lang="en-US" altLang="zh-CN" sz="1600" b="1" dirty="0" smtClean="0">
               <a:solidFill>
@@ -15543,16 +15479,6 @@
               </a:rPr>
               <a:t>林彦希</a:t>
             </a:r>
-            <a:endParaRPr lang="zh-CN" altLang="en-US" b="1" dirty="0">
-              <a:solidFill>
-                <a:schemeClr val="tx1">
-                  <a:lumMod val="75000"/>
-                  <a:lumOff val="25000"/>
-                </a:schemeClr>
-              </a:solidFill>
-              <a:latin typeface="微软雅黑" panose="020B0503020204020204" pitchFamily="34" charset="-122"/>
-              <a:ea typeface="微软雅黑" panose="020B0503020204020204" pitchFamily="34" charset="-122"/>
-            </a:endParaRPr>
           </a:p>
         </p:txBody>
       </p:sp>
@@ -15565,7 +15491,7 @@
         <p:spPr>
           <a:xfrm>
             <a:off x="2195736" y="2116729"/>
-            <a:ext cx="6048672" cy="1569660"/>
+            <a:ext cx="6048672" cy="1938992"/>
           </a:xfrm>
           <a:prstGeom prst="rect">
             <a:avLst/>
@@ -15596,7 +15522,20 @@
                 <a:latin typeface="微软雅黑" panose="020B0503020204020204" pitchFamily="34" charset="-122"/>
                 <a:ea typeface="微软雅黑" panose="020B0503020204020204" pitchFamily="34" charset="-122"/>
               </a:rPr>
-              <a:t>撰写使用手册</a:t>
+              <a:t>撰写使用</a:t>
+            </a:r>
+            <a:r>
+              <a:rPr lang="zh-CN" altLang="en-US" sz="1600" b="1" dirty="0" smtClean="0">
+                <a:solidFill>
+                  <a:schemeClr val="tx1">
+                    <a:lumMod val="75000"/>
+                    <a:lumOff val="25000"/>
+                  </a:schemeClr>
+                </a:solidFill>
+                <a:latin typeface="微软雅黑" panose="020B0503020204020204" pitchFamily="34" charset="-122"/>
+                <a:ea typeface="微软雅黑" panose="020B0503020204020204" pitchFamily="34" charset="-122"/>
+              </a:rPr>
+              <a:t>手册</a:t>
             </a:r>
             <a:endParaRPr lang="en-US" altLang="zh-CN" sz="1600" b="1" dirty="0" smtClean="0">
               <a:solidFill>
@@ -15618,7 +15557,7 @@
               <a:buChar char="Ø"/>
             </a:pPr>
             <a:r>
-              <a:rPr lang="zh-CN" altLang="en-US" sz="1600" b="1" dirty="0" smtClean="0">
+              <a:rPr lang="en-US" altLang="zh-CN" sz="1600" b="1" dirty="0" smtClean="0">
                 <a:solidFill>
                   <a:schemeClr val="tx1">
                     <a:lumMod val="75000"/>
@@ -15628,7 +15567,20 @@
                 <a:latin typeface="微软雅黑" panose="020B0503020204020204" pitchFamily="34" charset="-122"/>
                 <a:ea typeface="微软雅黑" panose="020B0503020204020204" pitchFamily="34" charset="-122"/>
               </a:rPr>
-              <a:t>写出列车相关的头文件（已被整合入数据库）</a:t>
+              <a:t>Ticket</a:t>
+            </a:r>
+            <a:r>
+              <a:rPr lang="zh-CN" altLang="en-US" sz="1600" b="1" dirty="0" smtClean="0">
+                <a:solidFill>
+                  <a:schemeClr val="tx1">
+                    <a:lumMod val="75000"/>
+                    <a:lumOff val="25000"/>
+                  </a:schemeClr>
+                </a:solidFill>
+                <a:latin typeface="微软雅黑" panose="020B0503020204020204" pitchFamily="34" charset="-122"/>
+                <a:ea typeface="微软雅黑" panose="020B0503020204020204" pitchFamily="34" charset="-122"/>
+              </a:rPr>
+              <a:t>类的一部分</a:t>
             </a:r>
             <a:endParaRPr lang="en-US" altLang="zh-CN" sz="1600" b="1" dirty="0" smtClean="0">
               <a:solidFill>
@@ -15660,7 +15612,7 @@
                 <a:latin typeface="微软雅黑" panose="020B0503020204020204" pitchFamily="34" charset="-122"/>
                 <a:ea typeface="微软雅黑" panose="020B0503020204020204" pitchFamily="34" charset="-122"/>
               </a:rPr>
-              <a:t>写出哈希表（但由于一些</a:t>
+              <a:t>写出列车</a:t>
             </a:r>
             <a:r>
               <a:rPr lang="zh-CN" altLang="en-US" sz="1600" b="1" dirty="0" smtClean="0">
@@ -15673,10 +15625,10 @@
                 <a:latin typeface="微软雅黑" panose="020B0503020204020204" pitchFamily="34" charset="-122"/>
                 <a:ea typeface="微软雅黑" panose="020B0503020204020204" pitchFamily="34" charset="-122"/>
               </a:rPr>
-              <a:t>问题</a:t>
-            </a:r>
-            <a:r>
-              <a:rPr lang="en-US" altLang="zh-CN" sz="1600" b="1" dirty="0" smtClean="0">
+              <a:t>相关部分头文件</a:t>
+            </a:r>
+            <a:r>
+              <a:rPr lang="zh-CN" altLang="en-US" sz="1600" b="1" dirty="0" smtClean="0">
                 <a:solidFill>
                   <a:schemeClr val="tx1">
                     <a:lumMod val="75000"/>
@@ -15686,7 +15638,7 @@
                 <a:latin typeface="微软雅黑" panose="020B0503020204020204" pitchFamily="34" charset="-122"/>
                 <a:ea typeface="微软雅黑" panose="020B0503020204020204" pitchFamily="34" charset="-122"/>
               </a:rPr>
-              <a:t>,</a:t>
+              <a:t>（已</a:t>
             </a:r>
             <a:r>
               <a:rPr lang="zh-CN" altLang="en-US" sz="1600" b="1" dirty="0" smtClean="0">
@@ -15699,7 +15651,7 @@
                 <a:latin typeface="微软雅黑" panose="020B0503020204020204" pitchFamily="34" charset="-122"/>
                 <a:ea typeface="微软雅黑" panose="020B0503020204020204" pitchFamily="34" charset="-122"/>
               </a:rPr>
-              <a:t>后</a:t>
+              <a:t>被部分整合</a:t>
             </a:r>
             <a:r>
               <a:rPr lang="zh-CN" altLang="en-US" sz="1600" b="1" dirty="0" smtClean="0">
@@ -15712,7 +15664,65 @@
                 <a:latin typeface="微软雅黑" panose="020B0503020204020204" pitchFamily="34" charset="-122"/>
                 <a:ea typeface="微软雅黑" panose="020B0503020204020204" pitchFamily="34" charset="-122"/>
               </a:rPr>
-              <a:t>被</a:t>
+              <a:t>入数据库）</a:t>
+            </a:r>
+            <a:endParaRPr lang="en-US" altLang="zh-CN" sz="1600" b="1" dirty="0" smtClean="0">
+              <a:solidFill>
+                <a:schemeClr val="tx1">
+                  <a:lumMod val="75000"/>
+                  <a:lumOff val="25000"/>
+                </a:schemeClr>
+              </a:solidFill>
+              <a:latin typeface="微软雅黑" panose="020B0503020204020204" pitchFamily="34" charset="-122"/>
+              <a:ea typeface="微软雅黑" panose="020B0503020204020204" pitchFamily="34" charset="-122"/>
+            </a:endParaRPr>
+          </a:p>
+          <a:p>
+            <a:pPr marL="285750" lvl="0" indent="-285750">
+              <a:lnSpc>
+                <a:spcPct val="150000"/>
+              </a:lnSpc>
+              <a:buFont typeface="Wingdings" panose="05000000000000000000" pitchFamily="2" charset="2"/>
+              <a:buChar char="Ø"/>
+            </a:pPr>
+            <a:r>
+              <a:rPr lang="zh-CN" altLang="en-US" sz="1600" b="1" dirty="0" smtClean="0">
+                <a:solidFill>
+                  <a:schemeClr val="tx1">
+                    <a:lumMod val="75000"/>
+                    <a:lumOff val="25000"/>
+                  </a:schemeClr>
+                </a:solidFill>
+                <a:latin typeface="微软雅黑" panose="020B0503020204020204" pitchFamily="34" charset="-122"/>
+                <a:ea typeface="微软雅黑" panose="020B0503020204020204" pitchFamily="34" charset="-122"/>
+              </a:rPr>
+              <a:t>写出哈希表（但由于一些问题</a:t>
+            </a:r>
+            <a:r>
+              <a:rPr lang="en-US" altLang="zh-CN" sz="1600" b="1" dirty="0" smtClean="0">
+                <a:solidFill>
+                  <a:schemeClr val="tx1">
+                    <a:lumMod val="75000"/>
+                    <a:lumOff val="25000"/>
+                  </a:schemeClr>
+                </a:solidFill>
+                <a:latin typeface="微软雅黑" panose="020B0503020204020204" pitchFamily="34" charset="-122"/>
+                <a:ea typeface="微软雅黑" panose="020B0503020204020204" pitchFamily="34" charset="-122"/>
+              </a:rPr>
+              <a:t>,</a:t>
+            </a:r>
+            <a:r>
+              <a:rPr lang="zh-CN" altLang="en-US" sz="1600" b="1" dirty="0" smtClean="0">
+                <a:solidFill>
+                  <a:schemeClr val="tx1">
+                    <a:lumMod val="75000"/>
+                    <a:lumOff val="25000"/>
+                  </a:schemeClr>
+                </a:solidFill>
+                <a:latin typeface="微软雅黑" panose="020B0503020204020204" pitchFamily="34" charset="-122"/>
+                <a:ea typeface="微软雅黑" panose="020B0503020204020204" pitchFamily="34" charset="-122"/>
+              </a:rPr>
+              <a:t>后被</a:t>
             </a:r>
             <a:r>
               <a:rPr lang="en-US" altLang="zh-CN" sz="1600" b="1" dirty="0" smtClean="0">
@@ -18621,20 +18631,7 @@
                 <a:latin typeface="微软雅黑" panose="020B0503020204020204" pitchFamily="34" charset="-122"/>
                 <a:ea typeface="微软雅黑" panose="020B0503020204020204" pitchFamily="34" charset="-122"/>
               </a:rPr>
-              <a:t>S</a:t>
-            </a:r>
-            <a:r>
-              <a:rPr lang="en-US" altLang="zh-CN" sz="1600" b="1" dirty="0" smtClean="0">
-                <a:solidFill>
-                  <a:schemeClr val="tx1">
-                    <a:lumMod val="75000"/>
-                    <a:lumOff val="25000"/>
-                  </a:schemeClr>
-                </a:solidFill>
-                <a:latin typeface="微软雅黑" panose="020B0503020204020204" pitchFamily="34" charset="-122"/>
-                <a:ea typeface="微软雅黑" panose="020B0503020204020204" pitchFamily="34" charset="-122"/>
-              </a:rPr>
-              <a:t>tation</a:t>
+              <a:t>Station</a:t>
             </a:r>
             <a:r>
               <a:rPr lang="zh-CN" altLang="en-US" sz="1600" b="1" dirty="0" smtClean="0">
@@ -22634,10 +22631,10 @@
                 <a:latin typeface="微软雅黑" panose="020B0503020204020204" pitchFamily="34" charset="-122"/>
                 <a:ea typeface="微软雅黑" panose="020B0503020204020204" pitchFamily="34" charset="-122"/>
               </a:rPr>
-              <a:t>车票</a:t>
-            </a:r>
-            <a:r>
-              <a:rPr lang="zh-CN" altLang="en-US" sz="1600" b="1" dirty="0" smtClean="0">
+              <a:t>车票查询（</a:t>
+            </a:r>
+            <a:r>
+              <a:rPr lang="en-US" altLang="zh-CN" sz="1600" b="1" dirty="0" smtClean="0">
                 <a:solidFill>
                   <a:schemeClr val="tx1">
                     <a:lumMod val="75000"/>
@@ -22647,10 +22644,10 @@
                 <a:latin typeface="微软雅黑" panose="020B0503020204020204" pitchFamily="34" charset="-122"/>
                 <a:ea typeface="微软雅黑" panose="020B0503020204020204" pitchFamily="34" charset="-122"/>
               </a:rPr>
-              <a:t>查询（</a:t>
-            </a:r>
-            <a:r>
-              <a:rPr lang="en-US" altLang="zh-CN" sz="1600" b="1" dirty="0" smtClean="0">
+              <a:t>3</a:t>
+            </a:r>
+            <a:r>
+              <a:rPr lang="zh-CN" altLang="en-US" sz="1600" b="1" dirty="0" smtClean="0">
                 <a:solidFill>
                   <a:schemeClr val="tx1">
                     <a:lumMod val="75000"/>
@@ -22660,33 +22657,7 @@
                 <a:latin typeface="微软雅黑" panose="020B0503020204020204" pitchFamily="34" charset="-122"/>
                 <a:ea typeface="微软雅黑" panose="020B0503020204020204" pitchFamily="34" charset="-122"/>
               </a:rPr>
-              <a:t>3</a:t>
-            </a:r>
-            <a:r>
-              <a:rPr lang="zh-CN" altLang="en-US" sz="1600" b="1" dirty="0" smtClean="0">
-                <a:solidFill>
-                  <a:schemeClr val="tx1">
-                    <a:lumMod val="75000"/>
-                    <a:lumOff val="25000"/>
-                  </a:schemeClr>
-                </a:solidFill>
-                <a:latin typeface="微软雅黑" panose="020B0503020204020204" pitchFamily="34" charset="-122"/>
-                <a:ea typeface="微软雅黑" panose="020B0503020204020204" pitchFamily="34" charset="-122"/>
-              </a:rPr>
-              <a:t>种</a:t>
-            </a:r>
-            <a:r>
-              <a:rPr lang="zh-CN" altLang="en-US" sz="1600" b="1" dirty="0" smtClean="0">
-                <a:solidFill>
-                  <a:schemeClr val="tx1">
-                    <a:lumMod val="75000"/>
-                    <a:lumOff val="25000"/>
-                  </a:schemeClr>
-                </a:solidFill>
-                <a:latin typeface="微软雅黑" panose="020B0503020204020204" pitchFamily="34" charset="-122"/>
-                <a:ea typeface="微软雅黑" panose="020B0503020204020204" pitchFamily="34" charset="-122"/>
-              </a:rPr>
-              <a:t>方式）</a:t>
+              <a:t>种方式）</a:t>
             </a:r>
             <a:endParaRPr lang="en-US" altLang="zh-CN" sz="1600" b="1" dirty="0" smtClean="0">
               <a:solidFill>

</xml_diff>

<commit_message>
Add new things to ppt
</commit_message>
<xml_diff>
--- a/Presentation/presentation.pptx
+++ b/Presentation/presentation.pptx
@@ -248,7 +248,7 @@
           <a:p>
             <a:fld id="{9DCBE0DC-59D1-4492-A759-9B7E7B780E9C}" type="datetimeFigureOut">
               <a:rPr lang="zh-CN" altLang="en-US" smtClean="0"/>
-              <a:t>2017/5/16</a:t>
+              <a:t>2017/5/23</a:t>
             </a:fld>
             <a:endParaRPr lang="zh-CN" altLang="en-US"/>
           </a:p>
@@ -1120,7 +1120,7 @@
           <a:p>
             <a:fld id="{530820CF-B880-4189-942D-D702A7CBA730}" type="datetimeFigureOut">
               <a:rPr lang="zh-CN" altLang="en-US" smtClean="0"/>
-              <a:t>2017/5/16</a:t>
+              <a:t>2017/5/23</a:t>
             </a:fld>
             <a:endParaRPr lang="zh-CN" altLang="en-US"/>
           </a:p>
@@ -1285,7 +1285,7 @@
           <a:p>
             <a:fld id="{530820CF-B880-4189-942D-D702A7CBA730}" type="datetimeFigureOut">
               <a:rPr lang="zh-CN" altLang="en-US" smtClean="0"/>
-              <a:t>2017/5/16</a:t>
+              <a:t>2017/5/23</a:t>
             </a:fld>
             <a:endParaRPr lang="zh-CN" altLang="en-US"/>
           </a:p>
@@ -1460,7 +1460,7 @@
           <a:p>
             <a:fld id="{530820CF-B880-4189-942D-D702A7CBA730}" type="datetimeFigureOut">
               <a:rPr lang="zh-CN" altLang="en-US" smtClean="0"/>
-              <a:t>2017/5/16</a:t>
+              <a:t>2017/5/23</a:t>
             </a:fld>
             <a:endParaRPr lang="zh-CN" altLang="en-US"/>
           </a:p>
@@ -1625,7 +1625,7 @@
           <a:p>
             <a:fld id="{530820CF-B880-4189-942D-D702A7CBA730}" type="datetimeFigureOut">
               <a:rPr lang="zh-CN" altLang="en-US" smtClean="0"/>
-              <a:t>2017/5/16</a:t>
+              <a:t>2017/5/23</a:t>
             </a:fld>
             <a:endParaRPr lang="zh-CN" altLang="en-US"/>
           </a:p>
@@ -1866,7 +1866,7 @@
           <a:p>
             <a:fld id="{530820CF-B880-4189-942D-D702A7CBA730}" type="datetimeFigureOut">
               <a:rPr lang="zh-CN" altLang="en-US" smtClean="0"/>
-              <a:t>2017/5/16</a:t>
+              <a:t>2017/5/23</a:t>
             </a:fld>
             <a:endParaRPr lang="zh-CN" altLang="en-US"/>
           </a:p>
@@ -2149,7 +2149,7 @@
           <a:p>
             <a:fld id="{530820CF-B880-4189-942D-D702A7CBA730}" type="datetimeFigureOut">
               <a:rPr lang="zh-CN" altLang="en-US" smtClean="0"/>
-              <a:t>2017/5/16</a:t>
+              <a:t>2017/5/23</a:t>
             </a:fld>
             <a:endParaRPr lang="zh-CN" altLang="en-US"/>
           </a:p>
@@ -2566,7 +2566,7 @@
           <a:p>
             <a:fld id="{530820CF-B880-4189-942D-D702A7CBA730}" type="datetimeFigureOut">
               <a:rPr lang="zh-CN" altLang="en-US" smtClean="0"/>
-              <a:t>2017/5/16</a:t>
+              <a:t>2017/5/23</a:t>
             </a:fld>
             <a:endParaRPr lang="zh-CN" altLang="en-US"/>
           </a:p>
@@ -2679,7 +2679,7 @@
           <a:p>
             <a:fld id="{530820CF-B880-4189-942D-D702A7CBA730}" type="datetimeFigureOut">
               <a:rPr lang="zh-CN" altLang="en-US" smtClean="0"/>
-              <a:t>2017/5/16</a:t>
+              <a:t>2017/5/23</a:t>
             </a:fld>
             <a:endParaRPr lang="zh-CN" altLang="en-US"/>
           </a:p>
@@ -2769,7 +2769,7 @@
           <a:p>
             <a:fld id="{530820CF-B880-4189-942D-D702A7CBA730}" type="datetimeFigureOut">
               <a:rPr lang="zh-CN" altLang="en-US" smtClean="0"/>
-              <a:t>2017/5/16</a:t>
+              <a:t>2017/5/23</a:t>
             </a:fld>
             <a:endParaRPr lang="zh-CN" altLang="en-US"/>
           </a:p>
@@ -3041,7 +3041,7 @@
           <a:p>
             <a:fld id="{530820CF-B880-4189-942D-D702A7CBA730}" type="datetimeFigureOut">
               <a:rPr lang="zh-CN" altLang="en-US" smtClean="0"/>
-              <a:t>2017/5/16</a:t>
+              <a:t>2017/5/23</a:t>
             </a:fld>
             <a:endParaRPr lang="zh-CN" altLang="en-US"/>
           </a:p>
@@ -3289,7 +3289,7 @@
           <a:p>
             <a:fld id="{530820CF-B880-4189-942D-D702A7CBA730}" type="datetimeFigureOut">
               <a:rPr lang="zh-CN" altLang="en-US" smtClean="0"/>
-              <a:t>2017/5/16</a:t>
+              <a:t>2017/5/23</a:t>
             </a:fld>
             <a:endParaRPr lang="zh-CN" altLang="en-US"/>
           </a:p>
@@ -3497,7 +3497,7 @@
           <a:p>
             <a:fld id="{530820CF-B880-4189-942D-D702A7CBA730}" type="datetimeFigureOut">
               <a:rPr lang="zh-CN" altLang="en-US" smtClean="0"/>
-              <a:t>2017/5/16</a:t>
+              <a:t>2017/5/23</a:t>
             </a:fld>
             <a:endParaRPr lang="zh-CN" altLang="en-US"/>
           </a:p>
@@ -14329,20 +14329,7 @@
                 <a:latin typeface="微软雅黑" panose="020B0503020204020204" pitchFamily="34" charset="-122"/>
                 <a:ea typeface="微软雅黑" panose="020B0503020204020204" pitchFamily="34" charset="-122"/>
               </a:rPr>
-              <a:t>等</a:t>
-            </a:r>
-            <a:r>
-              <a:rPr lang="zh-CN" altLang="en-US" sz="1600" b="1" dirty="0" smtClean="0">
-                <a:solidFill>
-                  <a:schemeClr val="tx1">
-                    <a:lumMod val="75000"/>
-                    <a:lumOff val="25000"/>
-                  </a:schemeClr>
-                </a:solidFill>
-                <a:latin typeface="微软雅黑" panose="020B0503020204020204" pitchFamily="34" charset="-122"/>
-                <a:ea typeface="微软雅黑" panose="020B0503020204020204" pitchFamily="34" charset="-122"/>
-              </a:rPr>
-              <a:t>）</a:t>
+              <a:t>等）</a:t>
             </a:r>
             <a:endParaRPr lang="en-US" altLang="zh-CN" sz="1600" b="1" dirty="0" smtClean="0">
               <a:solidFill>
@@ -14406,20 +14393,7 @@
                 <a:latin typeface="微软雅黑" panose="020B0503020204020204" pitchFamily="34" charset="-122"/>
                 <a:ea typeface="微软雅黑" panose="020B0503020204020204" pitchFamily="34" charset="-122"/>
               </a:rPr>
-              <a:t>后端</a:t>
-            </a:r>
-            <a:r>
-              <a:rPr lang="zh-CN" altLang="en-US" sz="1600" b="1" dirty="0" smtClean="0">
-                <a:solidFill>
-                  <a:schemeClr val="tx1">
-                    <a:lumMod val="75000"/>
-                    <a:lumOff val="25000"/>
-                  </a:schemeClr>
-                </a:solidFill>
-                <a:latin typeface="微软雅黑" panose="020B0503020204020204" pitchFamily="34" charset="-122"/>
-                <a:ea typeface="微软雅黑" panose="020B0503020204020204" pitchFamily="34" charset="-122"/>
-              </a:rPr>
-              <a:t>初步调试</a:t>
+              <a:t>后端初步调试</a:t>
             </a:r>
             <a:endParaRPr lang="en-US" altLang="zh-CN" sz="1600" b="1" dirty="0" smtClean="0">
               <a:solidFill>
@@ -15522,20 +15496,7 @@
                 <a:latin typeface="微软雅黑" panose="020B0503020204020204" pitchFamily="34" charset="-122"/>
                 <a:ea typeface="微软雅黑" panose="020B0503020204020204" pitchFamily="34" charset="-122"/>
               </a:rPr>
-              <a:t>撰写使用</a:t>
-            </a:r>
-            <a:r>
-              <a:rPr lang="zh-CN" altLang="en-US" sz="1600" b="1" dirty="0" smtClean="0">
-                <a:solidFill>
-                  <a:schemeClr val="tx1">
-                    <a:lumMod val="75000"/>
-                    <a:lumOff val="25000"/>
-                  </a:schemeClr>
-                </a:solidFill>
-                <a:latin typeface="微软雅黑" panose="020B0503020204020204" pitchFamily="34" charset="-122"/>
-                <a:ea typeface="微软雅黑" panose="020B0503020204020204" pitchFamily="34" charset="-122"/>
-              </a:rPr>
-              <a:t>手册</a:t>
+              <a:t>撰写使用手册</a:t>
             </a:r>
             <a:endParaRPr lang="en-US" altLang="zh-CN" sz="1600" b="1" dirty="0" smtClean="0">
               <a:solidFill>
@@ -15612,59 +15573,7 @@
                 <a:latin typeface="微软雅黑" panose="020B0503020204020204" pitchFamily="34" charset="-122"/>
                 <a:ea typeface="微软雅黑" panose="020B0503020204020204" pitchFamily="34" charset="-122"/>
               </a:rPr>
-              <a:t>写出列车</a:t>
-            </a:r>
-            <a:r>
-              <a:rPr lang="zh-CN" altLang="en-US" sz="1600" b="1" dirty="0" smtClean="0">
-                <a:solidFill>
-                  <a:schemeClr val="tx1">
-                    <a:lumMod val="75000"/>
-                    <a:lumOff val="25000"/>
-                  </a:schemeClr>
-                </a:solidFill>
-                <a:latin typeface="微软雅黑" panose="020B0503020204020204" pitchFamily="34" charset="-122"/>
-                <a:ea typeface="微软雅黑" panose="020B0503020204020204" pitchFamily="34" charset="-122"/>
-              </a:rPr>
-              <a:t>相关部分头文件</a:t>
-            </a:r>
-            <a:r>
-              <a:rPr lang="zh-CN" altLang="en-US" sz="1600" b="1" dirty="0" smtClean="0">
-                <a:solidFill>
-                  <a:schemeClr val="tx1">
-                    <a:lumMod val="75000"/>
-                    <a:lumOff val="25000"/>
-                  </a:schemeClr>
-                </a:solidFill>
-                <a:latin typeface="微软雅黑" panose="020B0503020204020204" pitchFamily="34" charset="-122"/>
-                <a:ea typeface="微软雅黑" panose="020B0503020204020204" pitchFamily="34" charset="-122"/>
-              </a:rPr>
-              <a:t>（已</a:t>
-            </a:r>
-            <a:r>
-              <a:rPr lang="zh-CN" altLang="en-US" sz="1600" b="1" dirty="0" smtClean="0">
-                <a:solidFill>
-                  <a:schemeClr val="tx1">
-                    <a:lumMod val="75000"/>
-                    <a:lumOff val="25000"/>
-                  </a:schemeClr>
-                </a:solidFill>
-                <a:latin typeface="微软雅黑" panose="020B0503020204020204" pitchFamily="34" charset="-122"/>
-                <a:ea typeface="微软雅黑" panose="020B0503020204020204" pitchFamily="34" charset="-122"/>
-              </a:rPr>
-              <a:t>被部分整合</a:t>
-            </a:r>
-            <a:r>
-              <a:rPr lang="zh-CN" altLang="en-US" sz="1600" b="1" dirty="0" smtClean="0">
-                <a:solidFill>
-                  <a:schemeClr val="tx1">
-                    <a:lumMod val="75000"/>
-                    <a:lumOff val="25000"/>
-                  </a:schemeClr>
-                </a:solidFill>
-                <a:latin typeface="微软雅黑" panose="020B0503020204020204" pitchFamily="34" charset="-122"/>
-                <a:ea typeface="微软雅黑" panose="020B0503020204020204" pitchFamily="34" charset="-122"/>
-              </a:rPr>
-              <a:t>入数据库）</a:t>
+              <a:t>写出列车相关部分头文件（已被部分整合入数据库）</a:t>
             </a:r>
             <a:endParaRPr lang="en-US" altLang="zh-CN" sz="1600" b="1" dirty="0" smtClean="0">
               <a:solidFill>
@@ -18542,7 +18451,7 @@
         <p:spPr>
           <a:xfrm>
             <a:off x="2195736" y="2116729"/>
-            <a:ext cx="6048672" cy="1200329"/>
+            <a:ext cx="6048672" cy="1569660"/>
           </a:xfrm>
           <a:prstGeom prst="rect">
             <a:avLst/>
@@ -18554,6 +18463,38 @@
             <a:spAutoFit/>
           </a:bodyPr>
           <a:lstStyle/>
+          <a:p>
+            <a:pPr marL="285750" lvl="0" indent="-285750">
+              <a:lnSpc>
+                <a:spcPct val="150000"/>
+              </a:lnSpc>
+              <a:buFont typeface="Wingdings" panose="05000000000000000000" pitchFamily="2" charset="2"/>
+              <a:buChar char="Ø"/>
+            </a:pPr>
+            <a:r>
+              <a:rPr lang="zh-CN" altLang="en-US" sz="1600" b="1" smtClean="0">
+                <a:solidFill>
+                  <a:schemeClr val="tx1">
+                    <a:lumMod val="75000"/>
+                    <a:lumOff val="25000"/>
+                  </a:schemeClr>
+                </a:solidFill>
+                <a:latin typeface="微软雅黑" panose="020B0503020204020204" pitchFamily="34" charset="-122"/>
+                <a:ea typeface="微软雅黑" panose="020B0503020204020204" pitchFamily="34" charset="-122"/>
+              </a:rPr>
+              <a:t>各种手册的撰写</a:t>
+            </a:r>
+            <a:endParaRPr lang="en-US" altLang="zh-CN" sz="1600" b="1" dirty="0" smtClean="0">
+              <a:solidFill>
+                <a:schemeClr val="tx1">
+                  <a:lumMod val="75000"/>
+                  <a:lumOff val="25000"/>
+                </a:schemeClr>
+              </a:solidFill>
+              <a:latin typeface="微软雅黑" panose="020B0503020204020204" pitchFamily="34" charset="-122"/>
+              <a:ea typeface="微软雅黑" panose="020B0503020204020204" pitchFamily="34" charset="-122"/>
+            </a:endParaRPr>
+          </a:p>
           <a:p>
             <a:pPr marL="285750" lvl="0" indent="-285750">
               <a:lnSpc>
@@ -22373,8 +22314,8 @@
         </p:nvSpPr>
         <p:spPr>
           <a:xfrm>
-            <a:off x="6782220" y="1649470"/>
-            <a:ext cx="1911027" cy="338554"/>
+            <a:off x="6782220" y="1526360"/>
+            <a:ext cx="1911027" cy="584775"/>
           </a:xfrm>
           <a:prstGeom prst="rect">
             <a:avLst/>
@@ -22387,19 +22328,6 @@
           </a:bodyPr>
           <a:lstStyle/>
           <a:p>
-            <a:r>
-              <a:rPr lang="en-US" altLang="zh-CN" sz="1600" b="1" dirty="0" smtClean="0">
-                <a:solidFill>
-                  <a:schemeClr val="tx1">
-                    <a:lumMod val="75000"/>
-                    <a:lumOff val="25000"/>
-                  </a:schemeClr>
-                </a:solidFill>
-                <a:latin typeface="微软雅黑" panose="020B0503020204020204" pitchFamily="34" charset="-122"/>
-                <a:ea typeface="微软雅黑" panose="020B0503020204020204" pitchFamily="34" charset="-122"/>
-              </a:rPr>
-              <a:t>//</a:t>
-            </a:r>
             <a:r>
               <a:rPr lang="zh-CN" altLang="en-US" sz="1600" b="1" dirty="0" smtClean="0">
                 <a:solidFill>
@@ -22411,7 +22339,7 @@
                 <a:latin typeface="微软雅黑" panose="020B0503020204020204" pitchFamily="34" charset="-122"/>
                 <a:ea typeface="微软雅黑" panose="020B0503020204020204" pitchFamily="34" charset="-122"/>
               </a:rPr>
-              <a:t>管理员登录</a:t>
+              <a:t>管理员登录（提升权限）</a:t>
             </a:r>
             <a:endParaRPr lang="en-US" altLang="zh-CN" sz="1600" b="1" dirty="0">
               <a:solidFill>
@@ -22449,19 +22377,6 @@
           <a:lstStyle/>
           <a:p>
             <a:r>
-              <a:rPr lang="en-US" altLang="zh-CN" sz="1600" b="1" dirty="0" smtClean="0">
-                <a:solidFill>
-                  <a:schemeClr val="tx1">
-                    <a:lumMod val="75000"/>
-                    <a:lumOff val="25000"/>
-                  </a:schemeClr>
-                </a:solidFill>
-                <a:latin typeface="微软雅黑" panose="020B0503020204020204" pitchFamily="34" charset="-122"/>
-                <a:ea typeface="微软雅黑" panose="020B0503020204020204" pitchFamily="34" charset="-122"/>
-              </a:rPr>
-              <a:t>//</a:t>
-            </a:r>
-            <a:r>
               <a:rPr lang="zh-CN" altLang="en-US" sz="1600" b="1" dirty="0" smtClean="0">
                 <a:solidFill>
                   <a:schemeClr val="tx1">
@@ -22472,7 +22387,20 @@
                 <a:latin typeface="微软雅黑" panose="020B0503020204020204" pitchFamily="34" charset="-122"/>
                 <a:ea typeface="微软雅黑" panose="020B0503020204020204" pitchFamily="34" charset="-122"/>
               </a:rPr>
-              <a:t>查询修改用户</a:t>
+              <a:t>查询</a:t>
+            </a:r>
+            <a:r>
+              <a:rPr lang="zh-CN" altLang="en-US" sz="1600" b="1" dirty="0" smtClean="0">
+                <a:solidFill>
+                  <a:schemeClr val="tx1">
+                    <a:lumMod val="75000"/>
+                    <a:lumOff val="25000"/>
+                  </a:schemeClr>
+                </a:solidFill>
+                <a:latin typeface="微软雅黑" panose="020B0503020204020204" pitchFamily="34" charset="-122"/>
+                <a:ea typeface="微软雅黑" panose="020B0503020204020204" pitchFamily="34" charset="-122"/>
+              </a:rPr>
+              <a:t>修改用户</a:t>
             </a:r>
             <a:endParaRPr lang="en-US" altLang="zh-CN" sz="1600" b="1" dirty="0">
               <a:solidFill>
@@ -22510,19 +22438,6 @@
           <a:lstStyle/>
           <a:p>
             <a:r>
-              <a:rPr lang="en-US" altLang="zh-CN" sz="1600" b="1" dirty="0" smtClean="0">
-                <a:solidFill>
-                  <a:schemeClr val="tx1">
-                    <a:lumMod val="75000"/>
-                    <a:lumOff val="25000"/>
-                  </a:schemeClr>
-                </a:solidFill>
-                <a:latin typeface="微软雅黑" panose="020B0503020204020204" pitchFamily="34" charset="-122"/>
-                <a:ea typeface="微软雅黑" panose="020B0503020204020204" pitchFamily="34" charset="-122"/>
-              </a:rPr>
-              <a:t>//</a:t>
-            </a:r>
-            <a:r>
               <a:rPr lang="zh-CN" altLang="en-US" sz="1600" b="1" dirty="0" smtClean="0">
                 <a:solidFill>
                   <a:schemeClr val="tx1">
@@ -22533,7 +22448,20 @@
                 <a:latin typeface="微软雅黑" panose="020B0503020204020204" pitchFamily="34" charset="-122"/>
                 <a:ea typeface="微软雅黑" panose="020B0503020204020204" pitchFamily="34" charset="-122"/>
               </a:rPr>
-              <a:t>增删改运行计划</a:t>
+              <a:t>增删</a:t>
+            </a:r>
+            <a:r>
+              <a:rPr lang="zh-CN" altLang="en-US" sz="1600" b="1" dirty="0" smtClean="0">
+                <a:solidFill>
+                  <a:schemeClr val="tx1">
+                    <a:lumMod val="75000"/>
+                    <a:lumOff val="25000"/>
+                  </a:schemeClr>
+                </a:solidFill>
+                <a:latin typeface="微软雅黑" panose="020B0503020204020204" pitchFamily="34" charset="-122"/>
+                <a:ea typeface="微软雅黑" panose="020B0503020204020204" pitchFamily="34" charset="-122"/>
+              </a:rPr>
+              <a:t>改运行计划</a:t>
             </a:r>
             <a:endParaRPr lang="en-US" altLang="zh-CN" sz="1600" b="1" dirty="0">
               <a:solidFill>
@@ -27008,6 +26936,526 @@
               <a:t>匿名查票</a:t>
             </a:r>
             <a:endParaRPr lang="en-US" altLang="zh-CN" sz="1600" b="1" dirty="0" smtClean="0">
+              <a:solidFill>
+                <a:schemeClr val="tx1">
+                  <a:lumMod val="75000"/>
+                  <a:lumOff val="25000"/>
+                </a:schemeClr>
+              </a:solidFill>
+              <a:latin typeface="微软雅黑" panose="020B0503020204020204" pitchFamily="34" charset="-122"/>
+              <a:ea typeface="微软雅黑" panose="020B0503020204020204" pitchFamily="34" charset="-122"/>
+            </a:endParaRPr>
+          </a:p>
+        </p:txBody>
+      </p:sp>
+      <p:cxnSp>
+        <p:nvCxnSpPr>
+          <p:cNvPr id="66" name="直接连接符 65"/>
+          <p:cNvCxnSpPr/>
+          <p:nvPr/>
+        </p:nvCxnSpPr>
+        <p:spPr>
+          <a:xfrm flipH="1">
+            <a:off x="5340937" y="2807379"/>
+            <a:ext cx="2138537" cy="4266"/>
+          </a:xfrm>
+          <a:prstGeom prst="line">
+            <a:avLst/>
+          </a:prstGeom>
+          <a:ln w="6350">
+            <a:solidFill>
+              <a:schemeClr val="bg1"/>
+            </a:solidFill>
+            <a:prstDash val="sysDot"/>
+            <a:headEnd type="none"/>
+            <a:tailEnd type="none"/>
+          </a:ln>
+          <a:effectLst>
+            <a:outerShdw blurRad="50800" dist="38100" dir="8100000" algn="tr" rotWithShape="0">
+              <a:prstClr val="black">
+                <a:alpha val="40000"/>
+              </a:prstClr>
+            </a:outerShdw>
+          </a:effectLst>
+        </p:spPr>
+        <p:style>
+          <a:lnRef idx="1">
+            <a:schemeClr val="accent1"/>
+          </a:lnRef>
+          <a:fillRef idx="0">
+            <a:schemeClr val="accent1"/>
+          </a:fillRef>
+          <a:effectRef idx="0">
+            <a:schemeClr val="accent1"/>
+          </a:effectRef>
+          <a:fontRef idx="minor">
+            <a:schemeClr val="tx1"/>
+          </a:fontRef>
+        </p:style>
+      </p:cxnSp>
+      <p:sp>
+        <p:nvSpPr>
+          <p:cNvPr id="67" name="流程图: 联系 66"/>
+          <p:cNvSpPr/>
+          <p:nvPr/>
+        </p:nvSpPr>
+        <p:spPr>
+          <a:xfrm>
+            <a:off x="6139237" y="2488834"/>
+            <a:ext cx="646595" cy="633602"/>
+          </a:xfrm>
+          <a:prstGeom prst="flowChartConnector">
+            <a:avLst/>
+          </a:prstGeom>
+          <a:solidFill>
+            <a:srgbClr val="05AFC8"/>
+          </a:solidFill>
+          <a:ln w="57150">
+            <a:solidFill>
+              <a:schemeClr val="bg1">
+                <a:lumMod val="95000"/>
+              </a:schemeClr>
+            </a:solidFill>
+          </a:ln>
+          <a:effectLst>
+            <a:outerShdw blurRad="50800" dist="38100" dir="5400000" algn="t" rotWithShape="0">
+              <a:prstClr val="black">
+                <a:alpha val="40000"/>
+              </a:prstClr>
+            </a:outerShdw>
+          </a:effectLst>
+        </p:spPr>
+        <p:style>
+          <a:lnRef idx="2">
+            <a:schemeClr val="accent1">
+              <a:shade val="50000"/>
+            </a:schemeClr>
+          </a:lnRef>
+          <a:fillRef idx="1">
+            <a:schemeClr val="accent1"/>
+          </a:fillRef>
+          <a:effectRef idx="0">
+            <a:schemeClr val="accent1"/>
+          </a:effectRef>
+          <a:fontRef idx="minor">
+            <a:schemeClr val="lt1"/>
+          </a:fontRef>
+        </p:style>
+        <p:txBody>
+          <a:bodyPr rtlCol="0" anchor="ctr"/>
+          <a:lstStyle/>
+          <a:p>
+            <a:pPr algn="ctr"/>
+            <a:endParaRPr lang="zh-CN" altLang="en-US"/>
+          </a:p>
+        </p:txBody>
+      </p:sp>
+      <p:sp>
+        <p:nvSpPr>
+          <p:cNvPr id="68" name="流程图: 摘录 67"/>
+          <p:cNvSpPr/>
+          <p:nvPr/>
+        </p:nvSpPr>
+        <p:spPr>
+          <a:xfrm rot="5400000" flipH="1" flipV="1">
+            <a:off x="6172950" y="2625289"/>
+            <a:ext cx="440234" cy="360690"/>
+          </a:xfrm>
+          <a:prstGeom prst="flowChartExtract">
+            <a:avLst/>
+          </a:prstGeom>
+          <a:noFill/>
+          <a:ln w="12700">
+            <a:solidFill>
+              <a:schemeClr val="bg1"/>
+            </a:solidFill>
+          </a:ln>
+        </p:spPr>
+        <p:style>
+          <a:lnRef idx="2">
+            <a:schemeClr val="accent1">
+              <a:shade val="50000"/>
+            </a:schemeClr>
+          </a:lnRef>
+          <a:fillRef idx="1">
+            <a:schemeClr val="accent1"/>
+          </a:fillRef>
+          <a:effectRef idx="0">
+            <a:schemeClr val="accent1"/>
+          </a:effectRef>
+          <a:fontRef idx="minor">
+            <a:schemeClr val="lt1"/>
+          </a:fontRef>
+        </p:style>
+        <p:txBody>
+          <a:bodyPr rtlCol="0" anchor="ctr"/>
+          <a:lstStyle/>
+          <a:p>
+            <a:pPr algn="ctr"/>
+            <a:endParaRPr lang="zh-CN" altLang="en-US"/>
+          </a:p>
+        </p:txBody>
+      </p:sp>
+      <p:sp>
+        <p:nvSpPr>
+          <p:cNvPr id="69" name="TextBox 96"/>
+          <p:cNvSpPr txBox="1"/>
+          <p:nvPr/>
+        </p:nvSpPr>
+        <p:spPr>
+          <a:xfrm>
+            <a:off x="5837471" y="2651745"/>
+            <a:ext cx="1250122" cy="307777"/>
+          </a:xfrm>
+          <a:prstGeom prst="rect">
+            <a:avLst/>
+          </a:prstGeom>
+          <a:noFill/>
+        </p:spPr>
+        <p:txBody>
+          <a:bodyPr wrap="square" rtlCol="0" anchor="ctr">
+            <a:spAutoFit/>
+          </a:bodyPr>
+          <a:lstStyle/>
+          <a:p>
+            <a:pPr algn="ctr"/>
+            <a:r>
+              <a:rPr lang="en-US" altLang="zh-CN" sz="1400" b="1" dirty="0" smtClean="0">
+                <a:solidFill>
+                  <a:schemeClr val="bg1"/>
+                </a:solidFill>
+                <a:effectLst>
+                  <a:outerShdw blurRad="38100" dist="38100" dir="2700000" algn="tl">
+                    <a:srgbClr val="000000">
+                      <a:alpha val="43137"/>
+                    </a:srgbClr>
+                  </a:outerShdw>
+                </a:effectLst>
+                <a:latin typeface="微软雅黑" panose="020B0503020204020204" pitchFamily="34" charset="-122"/>
+                <a:ea typeface="微软雅黑" panose="020B0503020204020204" pitchFamily="34" charset="-122"/>
+              </a:rPr>
+              <a:t>06</a:t>
+            </a:r>
+            <a:endParaRPr lang="zh-CN" altLang="en-US" sz="1400" b="1" dirty="0">
+              <a:solidFill>
+                <a:schemeClr val="bg1"/>
+              </a:solidFill>
+              <a:effectLst>
+                <a:outerShdw blurRad="38100" dist="38100" dir="2700000" algn="tl">
+                  <a:srgbClr val="000000">
+                    <a:alpha val="43137"/>
+                  </a:srgbClr>
+                </a:outerShdw>
+              </a:effectLst>
+              <a:latin typeface="微软雅黑" panose="020B0503020204020204" pitchFamily="34" charset="-122"/>
+              <a:ea typeface="微软雅黑" panose="020B0503020204020204" pitchFamily="34" charset="-122"/>
+            </a:endParaRPr>
+          </a:p>
+        </p:txBody>
+      </p:sp>
+      <p:sp>
+        <p:nvSpPr>
+          <p:cNvPr id="70" name="TextBox 103"/>
+          <p:cNvSpPr txBox="1"/>
+          <p:nvPr/>
+        </p:nvSpPr>
+        <p:spPr>
+          <a:xfrm>
+            <a:off x="6822761" y="2696044"/>
+            <a:ext cx="1911027" cy="338554"/>
+          </a:xfrm>
+          <a:prstGeom prst="rect">
+            <a:avLst/>
+          </a:prstGeom>
+          <a:noFill/>
+        </p:spPr>
+        <p:txBody>
+          <a:bodyPr wrap="square" rtlCol="0" anchor="ctr">
+            <a:spAutoFit/>
+          </a:bodyPr>
+          <a:lstStyle/>
+          <a:p>
+            <a:r>
+              <a:rPr lang="zh-CN" altLang="en-US" sz="1600" b="1" dirty="0">
+                <a:solidFill>
+                  <a:schemeClr val="tx1">
+                    <a:lumMod val="75000"/>
+                    <a:lumOff val="25000"/>
+                  </a:schemeClr>
+                </a:solidFill>
+                <a:latin typeface="微软雅黑" panose="020B0503020204020204" pitchFamily="34" charset="-122"/>
+                <a:ea typeface="微软雅黑" panose="020B0503020204020204" pitchFamily="34" charset="-122"/>
+              </a:rPr>
+              <a:t>靓</a:t>
+            </a:r>
+            <a:r>
+              <a:rPr lang="zh-CN" altLang="en-US" sz="1600" b="1" dirty="0" smtClean="0">
+                <a:solidFill>
+                  <a:schemeClr val="tx1">
+                    <a:lumMod val="75000"/>
+                    <a:lumOff val="25000"/>
+                  </a:schemeClr>
+                </a:solidFill>
+                <a:latin typeface="微软雅黑" panose="020B0503020204020204" pitchFamily="34" charset="-122"/>
+                <a:ea typeface="微软雅黑" panose="020B0503020204020204" pitchFamily="34" charset="-122"/>
+              </a:rPr>
+              <a:t>号申请</a:t>
+            </a:r>
+            <a:endParaRPr lang="en-US" altLang="zh-CN" sz="1600" b="1" dirty="0">
+              <a:solidFill>
+                <a:schemeClr val="tx1">
+                  <a:lumMod val="75000"/>
+                  <a:lumOff val="25000"/>
+                </a:schemeClr>
+              </a:solidFill>
+              <a:latin typeface="微软雅黑" panose="020B0503020204020204" pitchFamily="34" charset="-122"/>
+              <a:ea typeface="微软雅黑" panose="020B0503020204020204" pitchFamily="34" charset="-122"/>
+            </a:endParaRPr>
+          </a:p>
+        </p:txBody>
+      </p:sp>
+      <p:cxnSp>
+        <p:nvCxnSpPr>
+          <p:cNvPr id="71" name="直接连接符 70"/>
+          <p:cNvCxnSpPr/>
+          <p:nvPr/>
+        </p:nvCxnSpPr>
+        <p:spPr>
+          <a:xfrm flipH="1">
+            <a:off x="2898890" y="2821915"/>
+            <a:ext cx="847170" cy="16568"/>
+          </a:xfrm>
+          <a:prstGeom prst="line">
+            <a:avLst/>
+          </a:prstGeom>
+          <a:ln w="6350">
+            <a:solidFill>
+              <a:schemeClr val="bg1"/>
+            </a:solidFill>
+            <a:prstDash val="sysDot"/>
+            <a:headEnd type="none"/>
+            <a:tailEnd type="none"/>
+          </a:ln>
+          <a:effectLst>
+            <a:outerShdw blurRad="50800" dist="38100" dir="8100000" algn="tr" rotWithShape="0">
+              <a:prstClr val="black">
+                <a:alpha val="40000"/>
+              </a:prstClr>
+            </a:outerShdw>
+          </a:effectLst>
+        </p:spPr>
+        <p:style>
+          <a:lnRef idx="1">
+            <a:schemeClr val="accent1"/>
+          </a:lnRef>
+          <a:fillRef idx="0">
+            <a:schemeClr val="accent1"/>
+          </a:fillRef>
+          <a:effectRef idx="0">
+            <a:schemeClr val="accent1"/>
+          </a:effectRef>
+          <a:fontRef idx="minor">
+            <a:schemeClr val="tx1"/>
+          </a:fontRef>
+        </p:style>
+      </p:cxnSp>
+      <p:sp>
+        <p:nvSpPr>
+          <p:cNvPr id="72" name="流程图: 联系 71"/>
+          <p:cNvSpPr/>
+          <p:nvPr/>
+        </p:nvSpPr>
+        <p:spPr>
+          <a:xfrm>
+            <a:off x="2255492" y="2553444"/>
+            <a:ext cx="646595" cy="633602"/>
+          </a:xfrm>
+          <a:prstGeom prst="flowChartConnector">
+            <a:avLst/>
+          </a:prstGeom>
+          <a:solidFill>
+            <a:srgbClr val="05AFC8"/>
+          </a:solidFill>
+          <a:ln w="57150">
+            <a:solidFill>
+              <a:schemeClr val="bg1">
+                <a:lumMod val="95000"/>
+              </a:schemeClr>
+            </a:solidFill>
+          </a:ln>
+          <a:effectLst>
+            <a:outerShdw blurRad="50800" dist="38100" dir="5400000" algn="t" rotWithShape="0">
+              <a:prstClr val="black">
+                <a:alpha val="40000"/>
+              </a:prstClr>
+            </a:outerShdw>
+          </a:effectLst>
+        </p:spPr>
+        <p:style>
+          <a:lnRef idx="2">
+            <a:schemeClr val="accent1">
+              <a:shade val="50000"/>
+            </a:schemeClr>
+          </a:lnRef>
+          <a:fillRef idx="1">
+            <a:schemeClr val="accent1"/>
+          </a:fillRef>
+          <a:effectRef idx="0">
+            <a:schemeClr val="accent1"/>
+          </a:effectRef>
+          <a:fontRef idx="minor">
+            <a:schemeClr val="lt1"/>
+          </a:fontRef>
+        </p:style>
+        <p:txBody>
+          <a:bodyPr rtlCol="0" anchor="ctr"/>
+          <a:lstStyle/>
+          <a:p>
+            <a:pPr algn="ctr"/>
+            <a:endParaRPr lang="zh-CN" altLang="en-US"/>
+          </a:p>
+        </p:txBody>
+      </p:sp>
+      <p:sp>
+        <p:nvSpPr>
+          <p:cNvPr id="73" name="流程图: 摘录 72"/>
+          <p:cNvSpPr/>
+          <p:nvPr/>
+        </p:nvSpPr>
+        <p:spPr>
+          <a:xfrm rot="16200000" flipH="1" flipV="1">
+            <a:off x="2411707" y="2675700"/>
+            <a:ext cx="440234" cy="360690"/>
+          </a:xfrm>
+          <a:prstGeom prst="flowChartExtract">
+            <a:avLst/>
+          </a:prstGeom>
+          <a:noFill/>
+          <a:ln w="12700">
+            <a:solidFill>
+              <a:schemeClr val="bg1"/>
+            </a:solidFill>
+          </a:ln>
+        </p:spPr>
+        <p:style>
+          <a:lnRef idx="2">
+            <a:schemeClr val="accent1">
+              <a:shade val="50000"/>
+            </a:schemeClr>
+          </a:lnRef>
+          <a:fillRef idx="1">
+            <a:schemeClr val="accent1"/>
+          </a:fillRef>
+          <a:effectRef idx="0">
+            <a:schemeClr val="accent1"/>
+          </a:effectRef>
+          <a:fontRef idx="minor">
+            <a:schemeClr val="lt1"/>
+          </a:fontRef>
+        </p:style>
+        <p:txBody>
+          <a:bodyPr rtlCol="0" anchor="ctr"/>
+          <a:lstStyle/>
+          <a:p>
+            <a:pPr algn="ctr"/>
+            <a:endParaRPr lang="zh-CN" altLang="en-US"/>
+          </a:p>
+        </p:txBody>
+      </p:sp>
+      <p:sp>
+        <p:nvSpPr>
+          <p:cNvPr id="74" name="TextBox 92"/>
+          <p:cNvSpPr txBox="1"/>
+          <p:nvPr/>
+        </p:nvSpPr>
+        <p:spPr>
+          <a:xfrm>
+            <a:off x="1952657" y="2702156"/>
+            <a:ext cx="1250122" cy="307777"/>
+          </a:xfrm>
+          <a:prstGeom prst="rect">
+            <a:avLst/>
+          </a:prstGeom>
+          <a:noFill/>
+        </p:spPr>
+        <p:txBody>
+          <a:bodyPr wrap="square" rtlCol="0" anchor="ctr">
+            <a:spAutoFit/>
+          </a:bodyPr>
+          <a:lstStyle/>
+          <a:p>
+            <a:pPr algn="ctr"/>
+            <a:r>
+              <a:rPr lang="en-US" altLang="zh-CN" sz="1400" b="1" dirty="0" smtClean="0">
+                <a:solidFill>
+                  <a:schemeClr val="bg1"/>
+                </a:solidFill>
+                <a:effectLst>
+                  <a:outerShdw blurRad="38100" dist="38100" dir="2700000" algn="tl">
+                    <a:srgbClr val="000000">
+                      <a:alpha val="43137"/>
+                    </a:srgbClr>
+                  </a:outerShdw>
+                </a:effectLst>
+                <a:latin typeface="微软雅黑" panose="020B0503020204020204" pitchFamily="34" charset="-122"/>
+                <a:ea typeface="微软雅黑" panose="020B0503020204020204" pitchFamily="34" charset="-122"/>
+              </a:rPr>
+              <a:t>07</a:t>
+            </a:r>
+            <a:endParaRPr lang="zh-CN" altLang="en-US" sz="1400" b="1" dirty="0">
+              <a:solidFill>
+                <a:schemeClr val="bg1"/>
+              </a:solidFill>
+              <a:effectLst>
+                <a:outerShdw blurRad="38100" dist="38100" dir="2700000" algn="tl">
+                  <a:srgbClr val="000000">
+                    <a:alpha val="43137"/>
+                  </a:srgbClr>
+                </a:outerShdw>
+              </a:effectLst>
+              <a:latin typeface="微软雅黑" panose="020B0503020204020204" pitchFamily="34" charset="-122"/>
+              <a:ea typeface="微软雅黑" panose="020B0503020204020204" pitchFamily="34" charset="-122"/>
+            </a:endParaRPr>
+          </a:p>
+        </p:txBody>
+      </p:sp>
+      <p:sp>
+        <p:nvSpPr>
+          <p:cNvPr id="75" name="TextBox 119"/>
+          <p:cNvSpPr txBox="1"/>
+          <p:nvPr/>
+        </p:nvSpPr>
+        <p:spPr>
+          <a:xfrm>
+            <a:off x="356719" y="2717238"/>
+            <a:ext cx="1911027" cy="338554"/>
+          </a:xfrm>
+          <a:prstGeom prst="rect">
+            <a:avLst/>
+          </a:prstGeom>
+          <a:noFill/>
+        </p:spPr>
+        <p:txBody>
+          <a:bodyPr wrap="square" rtlCol="0" anchor="ctr">
+            <a:spAutoFit/>
+          </a:bodyPr>
+          <a:lstStyle/>
+          <a:p>
+            <a:pPr algn="r"/>
+            <a:r>
+              <a:rPr lang="zh-CN" altLang="en-US" sz="1600" b="1" dirty="0" smtClean="0">
+                <a:solidFill>
+                  <a:schemeClr val="tx1">
+                    <a:lumMod val="75000"/>
+                    <a:lumOff val="25000"/>
+                  </a:schemeClr>
+                </a:solidFill>
+                <a:latin typeface="微软雅黑" panose="020B0503020204020204" pitchFamily="34" charset="-122"/>
+                <a:ea typeface="微软雅黑" panose="020B0503020204020204" pitchFamily="34" charset="-122"/>
+              </a:rPr>
+              <a:t>试试手气</a:t>
+            </a:r>
+            <a:endParaRPr lang="en-US" altLang="zh-CN" sz="1600" b="1" dirty="0">
               <a:solidFill>
                 <a:schemeClr val="tx1">
                   <a:lumMod val="75000"/>

</xml_diff>